<commit_message>
add slides for CART, C45, C50
</commit_message>
<xml_diff>
--- a/Risk Classification for Prudential.pptx
+++ b/Risk Classification for Prudential.pptx
@@ -5,7 +5,7 @@
     <p:sldMasterId id="2147483648" r:id="rId1"/>
   </p:sldMasterIdLst>
   <p:notesMasterIdLst>
-    <p:notesMasterId r:id="rId23"/>
+    <p:notesMasterId r:id="rId24"/>
   </p:notesMasterIdLst>
   <p:sldIdLst>
     <p:sldId id="256" r:id="rId2"/>
@@ -18,17 +18,18 @@
     <p:sldId id="261" r:id="rId9"/>
     <p:sldId id="269" r:id="rId10"/>
     <p:sldId id="270" r:id="rId11"/>
-    <p:sldId id="262" r:id="rId12"/>
-    <p:sldId id="266" r:id="rId13"/>
-    <p:sldId id="279" r:id="rId14"/>
-    <p:sldId id="268" r:id="rId15"/>
-    <p:sldId id="280" r:id="rId16"/>
-    <p:sldId id="267" r:id="rId17"/>
-    <p:sldId id="281" r:id="rId18"/>
-    <p:sldId id="274" r:id="rId19"/>
-    <p:sldId id="275" r:id="rId20"/>
-    <p:sldId id="276" r:id="rId21"/>
-    <p:sldId id="277" r:id="rId22"/>
+    <p:sldId id="282" r:id="rId12"/>
+    <p:sldId id="262" r:id="rId13"/>
+    <p:sldId id="266" r:id="rId14"/>
+    <p:sldId id="279" r:id="rId15"/>
+    <p:sldId id="268" r:id="rId16"/>
+    <p:sldId id="280" r:id="rId17"/>
+    <p:sldId id="267" r:id="rId18"/>
+    <p:sldId id="281" r:id="rId19"/>
+    <p:sldId id="274" r:id="rId20"/>
+    <p:sldId id="275" r:id="rId21"/>
+    <p:sldId id="276" r:id="rId22"/>
+    <p:sldId id="277" r:id="rId23"/>
   </p:sldIdLst>
   <p:sldSz cx="12192000" cy="6858000"/>
   <p:notesSz cx="6858000" cy="9144000"/>
@@ -135,8 +136,12 @@
 </p:presentation>
 </file>
 
+<file path=ppt/revisionInfo.xml><?xml version="1.0" encoding="utf-8"?>
+<p1510:revInfo xmlns:a="http://schemas.openxmlformats.org/drawingml/2006/main" xmlns:r="http://schemas.openxmlformats.org/officeDocument/2006/relationships" xmlns:p1510="http://schemas.microsoft.com/office/powerpoint/2015/10/main"/>
+</file>
+
 <file path=ppt/charts/chart1.xml><?xml version="1.0" encoding="utf-8"?>
-<c:chartSpace xmlns:c="http://schemas.openxmlformats.org/drawingml/2006/chart" xmlns:a="http://schemas.openxmlformats.org/drawingml/2006/main" xmlns:r="http://schemas.openxmlformats.org/officeDocument/2006/relationships">
+<c:chartSpace xmlns:c="http://schemas.openxmlformats.org/drawingml/2006/chart" xmlns:a="http://schemas.openxmlformats.org/drawingml/2006/main" xmlns:r="http://schemas.openxmlformats.org/officeDocument/2006/relationships" xmlns:c16r2="http://schemas.microsoft.com/office/drawing/2015/06/chart">
   <c:date1904 val="0"/>
   <c:lang val="en-US"/>
   <c:roundedCorners val="0"/>
@@ -187,7 +192,6 @@
           </a:p>
         </c:rich>
       </c:tx>
-      <c:layout/>
       <c:overlay val="0"/>
       <c:spPr>
         <a:noFill/>
@@ -272,6 +276,11 @@
                 </a:outerShdw>
               </a:effectLst>
             </c:spPr>
+            <c:extLst>
+              <c:ext xmlns:c16="http://schemas.microsoft.com/office/drawing/2014/chart" uri="{C3380CC4-5D6E-409C-BE32-E72D297353CC}">
+                <c16:uniqueId val="{00000001-6BF6-41B1-A965-ACA7509F9E9A}"/>
+              </c:ext>
+            </c:extLst>
           </c:dPt>
           <c:dPt>
             <c:idx val="1"/>
@@ -314,6 +323,11 @@
                 </a:outerShdw>
               </a:effectLst>
             </c:spPr>
+            <c:extLst>
+              <c:ext xmlns:c16="http://schemas.microsoft.com/office/drawing/2014/chart" uri="{C3380CC4-5D6E-409C-BE32-E72D297353CC}">
+                <c16:uniqueId val="{00000003-6BF6-41B1-A965-ACA7509F9E9A}"/>
+              </c:ext>
+            </c:extLst>
           </c:dPt>
           <c:dPt>
             <c:idx val="2"/>
@@ -356,6 +370,11 @@
                 </a:outerShdw>
               </a:effectLst>
             </c:spPr>
+            <c:extLst>
+              <c:ext xmlns:c16="http://schemas.microsoft.com/office/drawing/2014/chart" uri="{C3380CC4-5D6E-409C-BE32-E72D297353CC}">
+                <c16:uniqueId val="{00000005-6BF6-41B1-A965-ACA7509F9E9A}"/>
+              </c:ext>
+            </c:extLst>
           </c:dPt>
           <c:dPt>
             <c:idx val="3"/>
@@ -398,6 +417,11 @@
                 </a:outerShdw>
               </a:effectLst>
             </c:spPr>
+            <c:extLst>
+              <c:ext xmlns:c16="http://schemas.microsoft.com/office/drawing/2014/chart" uri="{C3380CC4-5D6E-409C-BE32-E72D297353CC}">
+                <c16:uniqueId val="{00000007-6BF6-41B1-A965-ACA7509F9E9A}"/>
+              </c:ext>
+            </c:extLst>
           </c:dPt>
           <c:dPt>
             <c:idx val="4"/>
@@ -440,6 +464,11 @@
                 </a:outerShdw>
               </a:effectLst>
             </c:spPr>
+            <c:extLst>
+              <c:ext xmlns:c16="http://schemas.microsoft.com/office/drawing/2014/chart" uri="{C3380CC4-5D6E-409C-BE32-E72D297353CC}">
+                <c16:uniqueId val="{00000009-6BF6-41B1-A965-ACA7509F9E9A}"/>
+              </c:ext>
+            </c:extLst>
           </c:dPt>
           <c:dPt>
             <c:idx val="5"/>
@@ -482,6 +511,11 @@
                 </a:outerShdw>
               </a:effectLst>
             </c:spPr>
+            <c:extLst>
+              <c:ext xmlns:c16="http://schemas.microsoft.com/office/drawing/2014/chart" uri="{C3380CC4-5D6E-409C-BE32-E72D297353CC}">
+                <c16:uniqueId val="{0000000B-6BF6-41B1-A965-ACA7509F9E9A}"/>
+              </c:ext>
+            </c:extLst>
           </c:dPt>
           <c:dPt>
             <c:idx val="6"/>
@@ -527,6 +561,11 @@
                 </a:outerShdw>
               </a:effectLst>
             </c:spPr>
+            <c:extLst>
+              <c:ext xmlns:c16="http://schemas.microsoft.com/office/drawing/2014/chart" uri="{C3380CC4-5D6E-409C-BE32-E72D297353CC}">
+                <c16:uniqueId val="{0000000D-6BF6-41B1-A965-ACA7509F9E9A}"/>
+              </c:ext>
+            </c:extLst>
           </c:dPt>
           <c:dPt>
             <c:idx val="7"/>
@@ -572,6 +611,11 @@
                 </a:outerShdw>
               </a:effectLst>
             </c:spPr>
+            <c:extLst>
+              <c:ext xmlns:c16="http://schemas.microsoft.com/office/drawing/2014/chart" uri="{C3380CC4-5D6E-409C-BE32-E72D297353CC}">
+                <c16:uniqueId val="{0000000F-6BF6-41B1-A965-ACA7509F9E9A}"/>
+              </c:ext>
+            </c:extLst>
           </c:dPt>
           <c:dLbls>
             <c:spPr>
@@ -622,9 +666,7 @@
               </c:spPr>
             </c:leaderLines>
             <c:extLst>
-              <c:ext xmlns:c15="http://schemas.microsoft.com/office/drawing/2012/chart" uri="{CE6537A1-D6FC-4f65-9D91-7224C49458BB}">
-                <c15:layout/>
-              </c:ext>
+              <c:ext xmlns:c15="http://schemas.microsoft.com/office/drawing/2012/chart" uri="{CE6537A1-D6FC-4f65-9D91-7224C49458BB}"/>
             </c:extLst>
           </c:dLbls>
           <c:val>
@@ -634,32 +676,37 @@
                 <c:formatCode>General</c:formatCode>
                 <c:ptCount val="8"/>
                 <c:pt idx="0">
-                  <c:v>1.0</c:v>
+                  <c:v>1</c:v>
                 </c:pt>
                 <c:pt idx="1">
-                  <c:v>2.0</c:v>
+                  <c:v>2</c:v>
                 </c:pt>
                 <c:pt idx="2">
-                  <c:v>3.0</c:v>
+                  <c:v>3</c:v>
                 </c:pt>
                 <c:pt idx="3">
-                  <c:v>4.0</c:v>
+                  <c:v>4</c:v>
                 </c:pt>
                 <c:pt idx="4">
-                  <c:v>5.0</c:v>
+                  <c:v>5</c:v>
                 </c:pt>
                 <c:pt idx="5">
-                  <c:v>6.0</c:v>
+                  <c:v>6</c:v>
                 </c:pt>
                 <c:pt idx="6">
-                  <c:v>7.0</c:v>
+                  <c:v>7</c:v>
                 </c:pt>
                 <c:pt idx="7">
-                  <c:v>8.0</c:v>
+                  <c:v>8</c:v>
                 </c:pt>
               </c:numCache>
             </c:numRef>
           </c:val>
+          <c:extLst>
+            <c:ext xmlns:c16="http://schemas.microsoft.com/office/drawing/2014/chart" uri="{C3380CC4-5D6E-409C-BE32-E72D297353CC}">
+              <c16:uniqueId val="{00000010-6BF6-41B1-A965-ACA7509F9E9A}"/>
+            </c:ext>
+          </c:extLst>
         </c:ser>
         <c:ser>
           <c:idx val="1"/>
@@ -705,6 +752,11 @@
                 </a:outerShdw>
               </a:effectLst>
             </c:spPr>
+            <c:extLst>
+              <c:ext xmlns:c16="http://schemas.microsoft.com/office/drawing/2014/chart" uri="{C3380CC4-5D6E-409C-BE32-E72D297353CC}">
+                <c16:uniqueId val="{00000012-6BF6-41B1-A965-ACA7509F9E9A}"/>
+              </c:ext>
+            </c:extLst>
           </c:dPt>
           <c:dPt>
             <c:idx val="1"/>
@@ -747,6 +799,11 @@
                 </a:outerShdw>
               </a:effectLst>
             </c:spPr>
+            <c:extLst>
+              <c:ext xmlns:c16="http://schemas.microsoft.com/office/drawing/2014/chart" uri="{C3380CC4-5D6E-409C-BE32-E72D297353CC}">
+                <c16:uniqueId val="{00000014-6BF6-41B1-A965-ACA7509F9E9A}"/>
+              </c:ext>
+            </c:extLst>
           </c:dPt>
           <c:dPt>
             <c:idx val="2"/>
@@ -789,6 +846,11 @@
                 </a:outerShdw>
               </a:effectLst>
             </c:spPr>
+            <c:extLst>
+              <c:ext xmlns:c16="http://schemas.microsoft.com/office/drawing/2014/chart" uri="{C3380CC4-5D6E-409C-BE32-E72D297353CC}">
+                <c16:uniqueId val="{00000016-6BF6-41B1-A965-ACA7509F9E9A}"/>
+              </c:ext>
+            </c:extLst>
           </c:dPt>
           <c:dPt>
             <c:idx val="3"/>
@@ -831,6 +893,11 @@
                 </a:outerShdw>
               </a:effectLst>
             </c:spPr>
+            <c:extLst>
+              <c:ext xmlns:c16="http://schemas.microsoft.com/office/drawing/2014/chart" uri="{C3380CC4-5D6E-409C-BE32-E72D297353CC}">
+                <c16:uniqueId val="{00000018-6BF6-41B1-A965-ACA7509F9E9A}"/>
+              </c:ext>
+            </c:extLst>
           </c:dPt>
           <c:dPt>
             <c:idx val="4"/>
@@ -873,6 +940,11 @@
                 </a:outerShdw>
               </a:effectLst>
             </c:spPr>
+            <c:extLst>
+              <c:ext xmlns:c16="http://schemas.microsoft.com/office/drawing/2014/chart" uri="{C3380CC4-5D6E-409C-BE32-E72D297353CC}">
+                <c16:uniqueId val="{0000001A-6BF6-41B1-A965-ACA7509F9E9A}"/>
+              </c:ext>
+            </c:extLst>
           </c:dPt>
           <c:dPt>
             <c:idx val="5"/>
@@ -915,6 +987,11 @@
                 </a:outerShdw>
               </a:effectLst>
             </c:spPr>
+            <c:extLst>
+              <c:ext xmlns:c16="http://schemas.microsoft.com/office/drawing/2014/chart" uri="{C3380CC4-5D6E-409C-BE32-E72D297353CC}">
+                <c16:uniqueId val="{0000001C-6BF6-41B1-A965-ACA7509F9E9A}"/>
+              </c:ext>
+            </c:extLst>
           </c:dPt>
           <c:dPt>
             <c:idx val="6"/>
@@ -960,6 +1037,11 @@
                 </a:outerShdw>
               </a:effectLst>
             </c:spPr>
+            <c:extLst>
+              <c:ext xmlns:c16="http://schemas.microsoft.com/office/drawing/2014/chart" uri="{C3380CC4-5D6E-409C-BE32-E72D297353CC}">
+                <c16:uniqueId val="{0000001E-6BF6-41B1-A965-ACA7509F9E9A}"/>
+              </c:ext>
+            </c:extLst>
           </c:dPt>
           <c:dPt>
             <c:idx val="7"/>
@@ -1005,6 +1087,11 @@
                 </a:outerShdw>
               </a:effectLst>
             </c:spPr>
+            <c:extLst>
+              <c:ext xmlns:c16="http://schemas.microsoft.com/office/drawing/2014/chart" uri="{C3380CC4-5D6E-409C-BE32-E72D297353CC}">
+                <c16:uniqueId val="{00000020-6BF6-41B1-A965-ACA7509F9E9A}"/>
+              </c:ext>
+            </c:extLst>
           </c:dPt>
           <c:dLbls>
             <c:spPr>
@@ -1067,32 +1154,37 @@
                 <c:formatCode>General</c:formatCode>
                 <c:ptCount val="8"/>
                 <c:pt idx="0">
-                  <c:v>6207.0</c:v>
+                  <c:v>6207</c:v>
                 </c:pt>
                 <c:pt idx="1">
-                  <c:v>6552.0</c:v>
+                  <c:v>6552</c:v>
                 </c:pt>
                 <c:pt idx="2">
-                  <c:v>1013.0</c:v>
+                  <c:v>1013</c:v>
                 </c:pt>
                 <c:pt idx="3">
-                  <c:v>1428.0</c:v>
+                  <c:v>1428</c:v>
                 </c:pt>
                 <c:pt idx="4">
-                  <c:v>5432.0</c:v>
+                  <c:v>5432</c:v>
                 </c:pt>
                 <c:pt idx="5">
-                  <c:v>11233.0</c:v>
+                  <c:v>11233</c:v>
                 </c:pt>
                 <c:pt idx="6">
-                  <c:v>8027.0</c:v>
+                  <c:v>8027</c:v>
                 </c:pt>
                 <c:pt idx="7">
-                  <c:v>19489.0</c:v>
+                  <c:v>19489</c:v>
                 </c:pt>
               </c:numCache>
             </c:numRef>
           </c:val>
+          <c:extLst>
+            <c:ext xmlns:c16="http://schemas.microsoft.com/office/drawing/2014/chart" uri="{C3380CC4-5D6E-409C-BE32-E72D297353CC}">
+              <c16:uniqueId val="{00000021-6BF6-41B1-A965-ACA7509F9E9A}"/>
+            </c:ext>
+          </c:extLst>
         </c:ser>
         <c:dLbls>
           <c:dLblPos val="inEnd"/>
@@ -1116,7 +1208,6 @@
     </c:plotArea>
     <c:legend>
       <c:legendPos val="b"/>
-      <c:layout/>
       <c:overlay val="0"/>
       <c:spPr>
         <a:noFill/>
@@ -1809,7 +1900,7 @@
           <a:p>
             <a:fld id="{25FD3DD7-74B8-9144-B76B-9473B0B948F2}" type="datetimeFigureOut">
               <a:rPr lang="en-US" smtClean="0"/>
-              <a:t>12/5/17</a:t>
+              <a:t>12/5/2017</a:t>
             </a:fld>
             <a:endParaRPr lang="en-US"/>
           </a:p>
@@ -1873,38 +1964,37 @@
           <a:p>
             <a:pPr lvl="0"/>
             <a:r>
-              <a:rPr lang="en-US" smtClean="0"/>
+              <a:rPr lang="en-US"/>
               <a:t>Click to edit Master text styles</a:t>
             </a:r>
           </a:p>
           <a:p>
             <a:pPr lvl="1"/>
             <a:r>
-              <a:rPr lang="en-US" smtClean="0"/>
+              <a:rPr lang="en-US"/>
               <a:t>Second level</a:t>
             </a:r>
           </a:p>
           <a:p>
             <a:pPr lvl="2"/>
             <a:r>
-              <a:rPr lang="en-US" smtClean="0"/>
+              <a:rPr lang="en-US"/>
               <a:t>Third level</a:t>
             </a:r>
           </a:p>
           <a:p>
             <a:pPr lvl="3"/>
             <a:r>
-              <a:rPr lang="en-US" smtClean="0"/>
+              <a:rPr lang="en-US"/>
               <a:t>Fourth level</a:t>
             </a:r>
           </a:p>
           <a:p>
             <a:pPr lvl="4"/>
             <a:r>
-              <a:rPr lang="en-US" smtClean="0"/>
+              <a:rPr lang="en-US"/>
               <a:t>Fifth level</a:t>
             </a:r>
-            <a:endParaRPr lang="en-US"/>
           </a:p>
         </p:txBody>
       </p:sp>
@@ -2260,7 +2350,7 @@
           </a:lstStyle>
           <a:p>
             <a:r>
-              <a:rPr lang="en-US" smtClean="0"/>
+              <a:rPr lang="en-US"/>
               <a:t>Click to edit Master title style</a:t>
             </a:r>
             <a:endParaRPr lang="en-US" dirty="0"/>
@@ -2379,7 +2469,7 @@
           </a:lstStyle>
           <a:p>
             <a:r>
-              <a:rPr lang="en-US" smtClean="0"/>
+              <a:rPr lang="en-US"/>
               <a:t>Click to edit Master subtitle style</a:t>
             </a:r>
             <a:endParaRPr lang="en-US" dirty="0"/>
@@ -2409,7 +2499,7 @@
             <a:fld id="{B61BEF0D-F0BB-DE4B-95CE-6DB70DBA9567}" type="datetimeFigureOut">
               <a:rPr lang="en-US" dirty="0"/>
               <a:pPr/>
-              <a:t>12/5/17</a:t>
+              <a:t>12/5/2017</a:t>
             </a:fld>
             <a:endParaRPr lang="en-US" dirty="0"/>
           </a:p>
@@ -2550,7 +2640,7 @@
           </a:lstStyle>
           <a:p>
             <a:r>
-              <a:rPr lang="en-US" smtClean="0"/>
+              <a:rPr lang="en-US"/>
               <a:t>Click to edit Master title style</a:t>
             </a:r>
             <a:endParaRPr lang="en-US" dirty="0"/>
@@ -2638,7 +2728,7 @@
           </a:lstStyle>
           <a:p>
             <a:r>
-              <a:rPr lang="en-US" smtClean="0"/>
+              <a:rPr lang="en-US"/>
               <a:t>Click icon to add picture</a:t>
             </a:r>
             <a:endParaRPr lang="en-US" dirty="0"/>
@@ -2706,7 +2796,7 @@
           <a:p>
             <a:pPr lvl="0"/>
             <a:r>
-              <a:rPr lang="en-US" smtClean="0"/>
+              <a:rPr lang="en-US"/>
               <a:t>Click to edit Master text styles</a:t>
             </a:r>
           </a:p>
@@ -2730,7 +2820,7 @@
             <a:fld id="{B61BEF0D-F0BB-DE4B-95CE-6DB70DBA9567}" type="datetimeFigureOut">
               <a:rPr lang="en-US" dirty="0"/>
               <a:pPr/>
-              <a:t>12/5/17</a:t>
+              <a:t>12/5/2017</a:t>
             </a:fld>
             <a:endParaRPr lang="en-US" dirty="0"/>
           </a:p>
@@ -2831,7 +2921,7 @@
           </a:lstStyle>
           <a:p>
             <a:r>
-              <a:rPr lang="en-US" smtClean="0"/>
+              <a:rPr lang="en-US"/>
               <a:t>Click to edit Master title style</a:t>
             </a:r>
             <a:endParaRPr lang="en-US" dirty="0"/>
@@ -2951,7 +3041,7 @@
           <a:p>
             <a:pPr lvl="0"/>
             <a:r>
-              <a:rPr lang="en-US" smtClean="0"/>
+              <a:rPr lang="en-US"/>
               <a:t>Click to edit Master text styles</a:t>
             </a:r>
           </a:p>
@@ -2975,7 +3065,7 @@
             <a:fld id="{B61BEF0D-F0BB-DE4B-95CE-6DB70DBA9567}" type="datetimeFigureOut">
               <a:rPr lang="en-US" dirty="0"/>
               <a:pPr/>
-              <a:t>12/5/17</a:t>
+              <a:t>12/5/2017</a:t>
             </a:fld>
             <a:endParaRPr lang="en-US" dirty="0"/>
           </a:p>
@@ -3111,7 +3201,7 @@
           </a:lstStyle>
           <a:p>
             <a:r>
-              <a:rPr lang="en-US" smtClean="0"/>
+              <a:rPr lang="en-US"/>
               <a:t>Click to edit Master title style</a:t>
             </a:r>
             <a:endParaRPr lang="en-US" dirty="0"/>
@@ -3168,7 +3258,7 @@
           <a:p>
             <a:pPr lvl="0"/>
             <a:r>
-              <a:rPr lang="en-US" smtClean="0"/>
+              <a:rPr lang="en-US"/>
               <a:t>Click to edit Master text styles</a:t>
             </a:r>
           </a:p>
@@ -3287,7 +3377,7 @@
           <a:p>
             <a:pPr lvl="0"/>
             <a:r>
-              <a:rPr lang="en-US" smtClean="0"/>
+              <a:rPr lang="en-US"/>
               <a:t>Click to edit Master text styles</a:t>
             </a:r>
           </a:p>
@@ -3311,7 +3401,7 @@
             <a:fld id="{B61BEF0D-F0BB-DE4B-95CE-6DB70DBA9567}" type="datetimeFigureOut">
               <a:rPr lang="en-US" dirty="0"/>
               <a:pPr/>
-              <a:t>12/5/17</a:t>
+              <a:t>12/5/2017</a:t>
             </a:fld>
             <a:endParaRPr lang="en-US" dirty="0"/>
           </a:p>
@@ -3511,7 +3601,7 @@
           </a:lstStyle>
           <a:p>
             <a:r>
-              <a:rPr lang="en-US" smtClean="0"/>
+              <a:rPr lang="en-US"/>
               <a:t>Click to edit Master title style</a:t>
             </a:r>
             <a:endParaRPr lang="en-US" dirty="0"/>
@@ -3631,7 +3721,7 @@
           <a:p>
             <a:pPr lvl="0"/>
             <a:r>
-              <a:rPr lang="en-US" smtClean="0"/>
+              <a:rPr lang="en-US"/>
               <a:t>Click to edit Master text styles</a:t>
             </a:r>
           </a:p>
@@ -3655,7 +3745,7 @@
             <a:fld id="{B61BEF0D-F0BB-DE4B-95CE-6DB70DBA9567}" type="datetimeFigureOut">
               <a:rPr lang="en-US" dirty="0"/>
               <a:pPr/>
-              <a:t>12/5/17</a:t>
+              <a:t>12/5/2017</a:t>
             </a:fld>
             <a:endParaRPr lang="en-US" dirty="0"/>
           </a:p>
@@ -3760,7 +3850,7 @@
           </a:lstStyle>
           <a:p>
             <a:r>
-              <a:rPr lang="en-US" smtClean="0"/>
+              <a:rPr lang="en-US"/>
               <a:t>Click to edit Master title style</a:t>
             </a:r>
             <a:endParaRPr lang="en-US" dirty="0"/>
@@ -3883,7 +3973,7 @@
           <a:p>
             <a:pPr lvl="0"/>
             <a:r>
-              <a:rPr lang="en-US" smtClean="0"/>
+              <a:rPr lang="en-US"/>
               <a:t>Click to edit Master text styles</a:t>
             </a:r>
           </a:p>
@@ -4002,7 +4092,7 @@
           <a:p>
             <a:pPr lvl="0"/>
             <a:r>
-              <a:rPr lang="en-US" smtClean="0"/>
+              <a:rPr lang="en-US"/>
               <a:t>Click to edit Master text styles</a:t>
             </a:r>
           </a:p>
@@ -4026,7 +4116,7 @@
             <a:fld id="{B61BEF0D-F0BB-DE4B-95CE-6DB70DBA9567}" type="datetimeFigureOut">
               <a:rPr lang="en-US" dirty="0"/>
               <a:pPr/>
-              <a:t>12/5/17</a:t>
+              <a:t>12/5/2017</a:t>
             </a:fld>
             <a:endParaRPr lang="en-US" dirty="0"/>
           </a:p>
@@ -4227,7 +4317,7 @@
           <a:p>
             <a:pPr marL="0" lvl="0"/>
             <a:r>
-              <a:rPr lang="en-US" smtClean="0"/>
+              <a:rPr lang="en-US"/>
               <a:t>Click to edit Master title style</a:t>
             </a:r>
             <a:endParaRPr lang="en-US" dirty="0"/>
@@ -4350,7 +4440,7 @@
           <a:p>
             <a:pPr lvl="0"/>
             <a:r>
-              <a:rPr lang="en-US" smtClean="0"/>
+              <a:rPr lang="en-US"/>
               <a:t>Click to edit Master text styles</a:t>
             </a:r>
           </a:p>
@@ -4469,7 +4559,7 @@
           <a:p>
             <a:pPr lvl="0"/>
             <a:r>
-              <a:rPr lang="en-US" smtClean="0"/>
+              <a:rPr lang="en-US"/>
               <a:t>Click to edit Master text styles</a:t>
             </a:r>
           </a:p>
@@ -4493,7 +4583,7 @@
             <a:fld id="{B61BEF0D-F0BB-DE4B-95CE-6DB70DBA9567}" type="datetimeFigureOut">
               <a:rPr lang="en-US" dirty="0"/>
               <a:pPr/>
-              <a:t>12/5/17</a:t>
+              <a:t>12/5/2017</a:t>
             </a:fld>
             <a:endParaRPr lang="en-US" dirty="0"/>
           </a:p>
@@ -4618,7 +4708,7 @@
           </a:lstStyle>
           <a:p>
             <a:r>
-              <a:rPr lang="en-US" smtClean="0"/>
+              <a:rPr lang="en-US"/>
               <a:t>Click to edit Master title style</a:t>
             </a:r>
             <a:endParaRPr lang="en-US" dirty="0"/>
@@ -4642,35 +4732,35 @@
           <a:p>
             <a:pPr lvl="0"/>
             <a:r>
-              <a:rPr lang="en-US" smtClean="0"/>
+              <a:rPr lang="en-US"/>
               <a:t>Click to edit Master text styles</a:t>
             </a:r>
           </a:p>
           <a:p>
             <a:pPr lvl="1"/>
             <a:r>
-              <a:rPr lang="en-US" smtClean="0"/>
+              <a:rPr lang="en-US"/>
               <a:t>Second level</a:t>
             </a:r>
           </a:p>
           <a:p>
             <a:pPr lvl="2"/>
             <a:r>
-              <a:rPr lang="en-US" smtClean="0"/>
+              <a:rPr lang="en-US"/>
               <a:t>Third level</a:t>
             </a:r>
           </a:p>
           <a:p>
             <a:pPr lvl="3"/>
             <a:r>
-              <a:rPr lang="en-US" smtClean="0"/>
+              <a:rPr lang="en-US"/>
               <a:t>Fourth level</a:t>
             </a:r>
           </a:p>
           <a:p>
             <a:pPr lvl="4"/>
             <a:r>
-              <a:rPr lang="en-US" smtClean="0"/>
+              <a:rPr lang="en-US"/>
               <a:t>Fifth level</a:t>
             </a:r>
             <a:endParaRPr lang="en-US" dirty="0"/>
@@ -4695,7 +4785,7 @@
             <a:fld id="{B61BEF0D-F0BB-DE4B-95CE-6DB70DBA9567}" type="datetimeFigureOut">
               <a:rPr lang="en-US" dirty="0"/>
               <a:pPr/>
-              <a:t>12/5/17</a:t>
+              <a:t>12/5/2017</a:t>
             </a:fld>
             <a:endParaRPr lang="en-US" dirty="0"/>
           </a:p>
@@ -4821,7 +4911,7 @@
           <a:lstStyle/>
           <a:p>
             <a:r>
-              <a:rPr lang="en-US" smtClean="0"/>
+              <a:rPr lang="en-US"/>
               <a:t>Click to edit Master title style</a:t>
             </a:r>
             <a:endParaRPr lang="en-US" dirty="0"/>
@@ -4850,35 +4940,35 @@
           <a:p>
             <a:pPr lvl="0"/>
             <a:r>
-              <a:rPr lang="en-US" smtClean="0"/>
+              <a:rPr lang="en-US"/>
               <a:t>Click to edit Master text styles</a:t>
             </a:r>
           </a:p>
           <a:p>
             <a:pPr lvl="1"/>
             <a:r>
-              <a:rPr lang="en-US" smtClean="0"/>
+              <a:rPr lang="en-US"/>
               <a:t>Second level</a:t>
             </a:r>
           </a:p>
           <a:p>
             <a:pPr lvl="2"/>
             <a:r>
-              <a:rPr lang="en-US" smtClean="0"/>
+              <a:rPr lang="en-US"/>
               <a:t>Third level</a:t>
             </a:r>
           </a:p>
           <a:p>
             <a:pPr lvl="3"/>
             <a:r>
-              <a:rPr lang="en-US" smtClean="0"/>
+              <a:rPr lang="en-US"/>
               <a:t>Fourth level</a:t>
             </a:r>
           </a:p>
           <a:p>
             <a:pPr lvl="4"/>
             <a:r>
-              <a:rPr lang="en-US" smtClean="0"/>
+              <a:rPr lang="en-US"/>
               <a:t>Fifth level</a:t>
             </a:r>
             <a:endParaRPr lang="en-US" dirty="0"/>
@@ -4903,7 +4993,7 @@
             <a:fld id="{B61BEF0D-F0BB-DE4B-95CE-6DB70DBA9567}" type="datetimeFigureOut">
               <a:rPr lang="en-US" dirty="0"/>
               <a:pPr/>
-              <a:t>12/5/17</a:t>
+              <a:t>12/5/2017</a:t>
             </a:fld>
             <a:endParaRPr lang="en-US" dirty="0"/>
           </a:p>
@@ -5055,7 +5145,7 @@
           <a:lstStyle/>
           <a:p>
             <a:r>
-              <a:rPr lang="en-US" smtClean="0"/>
+              <a:rPr lang="en-US"/>
               <a:t>Click to edit Master title style</a:t>
             </a:r>
             <a:endParaRPr lang="en-US" dirty="0"/>
@@ -5079,35 +5169,35 @@
           <a:p>
             <a:pPr lvl="0"/>
             <a:r>
-              <a:rPr lang="en-US" smtClean="0"/>
+              <a:rPr lang="en-US"/>
               <a:t>Click to edit Master text styles</a:t>
             </a:r>
           </a:p>
           <a:p>
             <a:pPr lvl="1"/>
             <a:r>
-              <a:rPr lang="en-US" smtClean="0"/>
+              <a:rPr lang="en-US"/>
               <a:t>Second level</a:t>
             </a:r>
           </a:p>
           <a:p>
             <a:pPr lvl="2"/>
             <a:r>
-              <a:rPr lang="en-US" smtClean="0"/>
+              <a:rPr lang="en-US"/>
               <a:t>Third level</a:t>
             </a:r>
           </a:p>
           <a:p>
             <a:pPr lvl="3"/>
             <a:r>
-              <a:rPr lang="en-US" smtClean="0"/>
+              <a:rPr lang="en-US"/>
               <a:t>Fourth level</a:t>
             </a:r>
           </a:p>
           <a:p>
             <a:pPr lvl="4"/>
             <a:r>
-              <a:rPr lang="en-US" smtClean="0"/>
+              <a:rPr lang="en-US"/>
               <a:t>Fifth level</a:t>
             </a:r>
             <a:endParaRPr lang="en-US" dirty="0"/>
@@ -5131,7 +5221,7 @@
           <a:p>
             <a:fld id="{52647F38-B617-4D2F-AE0A-013F0C4D2C57}" type="datetimeFigureOut">
               <a:rPr lang="en-US" dirty="0"/>
-              <a:t>12/5/17</a:t>
+              <a:t>12/5/2017</a:t>
             </a:fld>
             <a:endParaRPr lang="en-US" dirty="0"/>
           </a:p>
@@ -5231,7 +5321,7 @@
           </a:lstStyle>
           <a:p>
             <a:r>
-              <a:rPr lang="en-US" smtClean="0"/>
+              <a:rPr lang="en-US"/>
               <a:t>Click to edit Master title style</a:t>
             </a:r>
             <a:endParaRPr lang="en-US" dirty="0"/>
@@ -5351,7 +5441,7 @@
           <a:p>
             <a:pPr lvl="0"/>
             <a:r>
-              <a:rPr lang="en-US" smtClean="0"/>
+              <a:rPr lang="en-US"/>
               <a:t>Click to edit Master text styles</a:t>
             </a:r>
           </a:p>
@@ -5375,7 +5465,7 @@
             <a:fld id="{B61BEF0D-F0BB-DE4B-95CE-6DB70DBA9567}" type="datetimeFigureOut">
               <a:rPr lang="en-US" dirty="0"/>
               <a:pPr/>
-              <a:t>12/5/17</a:t>
+              <a:t>12/5/2017</a:t>
             </a:fld>
             <a:endParaRPr lang="en-US" dirty="0"/>
           </a:p>
@@ -5527,7 +5617,7 @@
           <a:lstStyle/>
           <a:p>
             <a:r>
-              <a:rPr lang="en-US" smtClean="0"/>
+              <a:rPr lang="en-US"/>
               <a:t>Click to edit Master title style</a:t>
             </a:r>
             <a:endParaRPr lang="en-US" dirty="0"/>
@@ -5558,35 +5648,35 @@
           <a:p>
             <a:pPr lvl="0"/>
             <a:r>
-              <a:rPr lang="en-US" smtClean="0"/>
+              <a:rPr lang="en-US"/>
               <a:t>Click to edit Master text styles</a:t>
             </a:r>
           </a:p>
           <a:p>
             <a:pPr lvl="1"/>
             <a:r>
-              <a:rPr lang="en-US" smtClean="0"/>
+              <a:rPr lang="en-US"/>
               <a:t>Second level</a:t>
             </a:r>
           </a:p>
           <a:p>
             <a:pPr lvl="2"/>
             <a:r>
-              <a:rPr lang="en-US" smtClean="0"/>
+              <a:rPr lang="en-US"/>
               <a:t>Third level</a:t>
             </a:r>
           </a:p>
           <a:p>
             <a:pPr lvl="3"/>
             <a:r>
-              <a:rPr lang="en-US" smtClean="0"/>
+              <a:rPr lang="en-US"/>
               <a:t>Fourth level</a:t>
             </a:r>
           </a:p>
           <a:p>
             <a:pPr lvl="4"/>
             <a:r>
-              <a:rPr lang="en-US" smtClean="0"/>
+              <a:rPr lang="en-US"/>
               <a:t>Fifth level</a:t>
             </a:r>
             <a:endParaRPr lang="en-US" dirty="0"/>
@@ -5617,35 +5707,35 @@
           <a:p>
             <a:pPr lvl="0"/>
             <a:r>
-              <a:rPr lang="en-US" smtClean="0"/>
+              <a:rPr lang="en-US"/>
               <a:t>Click to edit Master text styles</a:t>
             </a:r>
           </a:p>
           <a:p>
             <a:pPr lvl="1"/>
             <a:r>
-              <a:rPr lang="en-US" smtClean="0"/>
+              <a:rPr lang="en-US"/>
               <a:t>Second level</a:t>
             </a:r>
           </a:p>
           <a:p>
             <a:pPr lvl="2"/>
             <a:r>
-              <a:rPr lang="en-US" smtClean="0"/>
+              <a:rPr lang="en-US"/>
               <a:t>Third level</a:t>
             </a:r>
           </a:p>
           <a:p>
             <a:pPr lvl="3"/>
             <a:r>
-              <a:rPr lang="en-US" smtClean="0"/>
+              <a:rPr lang="en-US"/>
               <a:t>Fourth level</a:t>
             </a:r>
           </a:p>
           <a:p>
             <a:pPr lvl="4"/>
             <a:r>
-              <a:rPr lang="en-US" smtClean="0"/>
+              <a:rPr lang="en-US"/>
               <a:t>Fifth level</a:t>
             </a:r>
             <a:endParaRPr lang="en-US" dirty="0"/>
@@ -5669,7 +5759,7 @@
           <a:p>
             <a:fld id="{05BFA754-D5C3-4E66-96A6-867B257F58DC}" type="datetimeFigureOut">
               <a:rPr lang="en-US" dirty="0"/>
-              <a:t>12/5/17</a:t>
+              <a:t>12/5/2017</a:t>
             </a:fld>
             <a:endParaRPr lang="en-US" dirty="0"/>
           </a:p>
@@ -5762,7 +5852,7 @@
           </a:lstStyle>
           <a:p>
             <a:r>
-              <a:rPr lang="en-US" smtClean="0"/>
+              <a:rPr lang="en-US"/>
               <a:t>Click to edit Master title style</a:t>
             </a:r>
             <a:endParaRPr lang="en-US" dirty="0"/>
@@ -5840,7 +5930,7 @@
           <a:p>
             <a:pPr lvl="0"/>
             <a:r>
-              <a:rPr lang="en-US" smtClean="0"/>
+              <a:rPr lang="en-US"/>
               <a:t>Click to edit Master text styles</a:t>
             </a:r>
           </a:p>
@@ -5870,35 +5960,35 @@
           <a:p>
             <a:pPr lvl="0"/>
             <a:r>
-              <a:rPr lang="en-US" smtClean="0"/>
+              <a:rPr lang="en-US"/>
               <a:t>Click to edit Master text styles</a:t>
             </a:r>
           </a:p>
           <a:p>
             <a:pPr lvl="1"/>
             <a:r>
-              <a:rPr lang="en-US" smtClean="0"/>
+              <a:rPr lang="en-US"/>
               <a:t>Second level</a:t>
             </a:r>
           </a:p>
           <a:p>
             <a:pPr lvl="2"/>
             <a:r>
-              <a:rPr lang="en-US" smtClean="0"/>
+              <a:rPr lang="en-US"/>
               <a:t>Third level</a:t>
             </a:r>
           </a:p>
           <a:p>
             <a:pPr lvl="3"/>
             <a:r>
-              <a:rPr lang="en-US" smtClean="0"/>
+              <a:rPr lang="en-US"/>
               <a:t>Fourth level</a:t>
             </a:r>
           </a:p>
           <a:p>
             <a:pPr lvl="4"/>
             <a:r>
-              <a:rPr lang="en-US" smtClean="0"/>
+              <a:rPr lang="en-US"/>
               <a:t>Fifth level</a:t>
             </a:r>
             <a:endParaRPr lang="en-US" dirty="0"/>
@@ -5976,7 +6066,7 @@
           <a:p>
             <a:pPr lvl="0"/>
             <a:r>
-              <a:rPr lang="en-US" smtClean="0"/>
+              <a:rPr lang="en-US"/>
               <a:t>Click to edit Master text styles</a:t>
             </a:r>
           </a:p>
@@ -6006,35 +6096,35 @@
           <a:p>
             <a:pPr lvl="0"/>
             <a:r>
-              <a:rPr lang="en-US" smtClean="0"/>
+              <a:rPr lang="en-US"/>
               <a:t>Click to edit Master text styles</a:t>
             </a:r>
           </a:p>
           <a:p>
             <a:pPr lvl="1"/>
             <a:r>
-              <a:rPr lang="en-US" smtClean="0"/>
+              <a:rPr lang="en-US"/>
               <a:t>Second level</a:t>
             </a:r>
           </a:p>
           <a:p>
             <a:pPr lvl="2"/>
             <a:r>
-              <a:rPr lang="en-US" smtClean="0"/>
+              <a:rPr lang="en-US"/>
               <a:t>Third level</a:t>
             </a:r>
           </a:p>
           <a:p>
             <a:pPr lvl="3"/>
             <a:r>
-              <a:rPr lang="en-US" smtClean="0"/>
+              <a:rPr lang="en-US"/>
               <a:t>Fourth level</a:t>
             </a:r>
           </a:p>
           <a:p>
             <a:pPr lvl="4"/>
             <a:r>
-              <a:rPr lang="en-US" smtClean="0"/>
+              <a:rPr lang="en-US"/>
               <a:t>Fifth level</a:t>
             </a:r>
             <a:endParaRPr lang="en-US" dirty="0"/>
@@ -6059,7 +6149,7 @@
             <a:fld id="{B61BEF0D-F0BB-DE4B-95CE-6DB70DBA9567}" type="datetimeFigureOut">
               <a:rPr lang="en-US" dirty="0"/>
               <a:pPr/>
-              <a:t>12/5/17</a:t>
+              <a:t>12/5/2017</a:t>
             </a:fld>
             <a:endParaRPr lang="en-US" dirty="0"/>
           </a:p>
@@ -6180,7 +6270,7 @@
           <a:lstStyle/>
           <a:p>
             <a:r>
-              <a:rPr lang="en-US" smtClean="0"/>
+              <a:rPr lang="en-US"/>
               <a:t>Click to edit Master title style</a:t>
             </a:r>
             <a:endParaRPr lang="en-US" dirty="0"/>
@@ -6205,7 +6295,7 @@
             <a:fld id="{B61BEF0D-F0BB-DE4B-95CE-6DB70DBA9567}" type="datetimeFigureOut">
               <a:rPr lang="en-US" dirty="0"/>
               <a:pPr/>
-              <a:t>12/5/17</a:t>
+              <a:t>12/5/2017</a:t>
             </a:fld>
             <a:endParaRPr lang="en-US" dirty="0"/>
           </a:p>
@@ -6328,7 +6418,7 @@
             <a:fld id="{B61BEF0D-F0BB-DE4B-95CE-6DB70DBA9567}" type="datetimeFigureOut">
               <a:rPr lang="en-US" dirty="0"/>
               <a:pPr/>
-              <a:t>12/5/17</a:t>
+              <a:t>12/5/2017</a:t>
             </a:fld>
             <a:endParaRPr lang="en-US" dirty="0"/>
           </a:p>
@@ -6429,7 +6519,7 @@
           </a:lstStyle>
           <a:p>
             <a:r>
-              <a:rPr lang="en-US" smtClean="0"/>
+              <a:rPr lang="en-US"/>
               <a:t>Click to edit Master title style</a:t>
             </a:r>
             <a:endParaRPr lang="en-US" dirty="0"/>
@@ -6460,35 +6550,35 @@
           <a:p>
             <a:pPr lvl="0"/>
             <a:r>
-              <a:rPr lang="en-US" smtClean="0"/>
+              <a:rPr lang="en-US"/>
               <a:t>Click to edit Master text styles</a:t>
             </a:r>
           </a:p>
           <a:p>
             <a:pPr lvl="1"/>
             <a:r>
-              <a:rPr lang="en-US" smtClean="0"/>
+              <a:rPr lang="en-US"/>
               <a:t>Second level</a:t>
             </a:r>
           </a:p>
           <a:p>
             <a:pPr lvl="2"/>
             <a:r>
-              <a:rPr lang="en-US" smtClean="0"/>
+              <a:rPr lang="en-US"/>
               <a:t>Third level</a:t>
             </a:r>
           </a:p>
           <a:p>
             <a:pPr lvl="3"/>
             <a:r>
-              <a:rPr lang="en-US" smtClean="0"/>
+              <a:rPr lang="en-US"/>
               <a:t>Fourth level</a:t>
             </a:r>
           </a:p>
           <a:p>
             <a:pPr lvl="4"/>
             <a:r>
-              <a:rPr lang="en-US" smtClean="0"/>
+              <a:rPr lang="en-US"/>
               <a:t>Fifth level</a:t>
             </a:r>
             <a:endParaRPr lang="en-US" dirty="0"/>
@@ -6556,7 +6646,7 @@
           <a:p>
             <a:pPr lvl="0"/>
             <a:r>
-              <a:rPr lang="en-US" smtClean="0"/>
+              <a:rPr lang="en-US"/>
               <a:t>Click to edit Master text styles</a:t>
             </a:r>
           </a:p>
@@ -6580,7 +6670,7 @@
             <a:fld id="{B61BEF0D-F0BB-DE4B-95CE-6DB70DBA9567}" type="datetimeFigureOut">
               <a:rPr lang="en-US" dirty="0"/>
               <a:pPr/>
-              <a:t>12/5/17</a:t>
+              <a:t>12/5/2017</a:t>
             </a:fld>
             <a:endParaRPr lang="en-US" dirty="0"/>
           </a:p>
@@ -6712,7 +6802,7 @@
           </a:lstStyle>
           <a:p>
             <a:r>
-              <a:rPr lang="en-US" smtClean="0"/>
+              <a:rPr lang="en-US"/>
               <a:t>Click to edit Master title style</a:t>
             </a:r>
             <a:endParaRPr lang="en-US" dirty="0"/>
@@ -6800,7 +6890,7 @@
           </a:lstStyle>
           <a:p>
             <a:r>
-              <a:rPr lang="en-US" smtClean="0"/>
+              <a:rPr lang="en-US"/>
               <a:t>Click icon to add picture</a:t>
             </a:r>
             <a:endParaRPr lang="en-US" dirty="0"/>
@@ -6868,7 +6958,7 @@
           <a:p>
             <a:pPr lvl="0"/>
             <a:r>
-              <a:rPr lang="en-US" smtClean="0"/>
+              <a:rPr lang="en-US"/>
               <a:t>Click to edit Master text styles</a:t>
             </a:r>
           </a:p>
@@ -6892,7 +6982,7 @@
             <a:fld id="{B61BEF0D-F0BB-DE4B-95CE-6DB70DBA9567}" type="datetimeFigureOut">
               <a:rPr lang="en-US" dirty="0"/>
               <a:pPr/>
-              <a:t>12/5/17</a:t>
+              <a:t>12/5/2017</a:t>
             </a:fld>
             <a:endParaRPr lang="en-US" dirty="0"/>
           </a:p>
@@ -7135,7 +7225,7 @@
           <a:lstStyle/>
           <a:p>
             <a:r>
-              <a:rPr lang="en-US" smtClean="0"/>
+              <a:rPr lang="en-US"/>
               <a:t>Click to edit Master title style</a:t>
             </a:r>
             <a:endParaRPr lang="en-US" dirty="0"/>
@@ -7169,35 +7259,35 @@
           <a:p>
             <a:pPr lvl="0"/>
             <a:r>
-              <a:rPr lang="en-US" smtClean="0"/>
+              <a:rPr lang="en-US"/>
               <a:t>Click to edit Master text styles</a:t>
             </a:r>
           </a:p>
           <a:p>
             <a:pPr lvl="1"/>
             <a:r>
-              <a:rPr lang="en-US" smtClean="0"/>
+              <a:rPr lang="en-US"/>
               <a:t>Second level</a:t>
             </a:r>
           </a:p>
           <a:p>
             <a:pPr lvl="2"/>
             <a:r>
-              <a:rPr lang="en-US" smtClean="0"/>
+              <a:rPr lang="en-US"/>
               <a:t>Third level</a:t>
             </a:r>
           </a:p>
           <a:p>
             <a:pPr lvl="3"/>
             <a:r>
-              <a:rPr lang="en-US" smtClean="0"/>
+              <a:rPr lang="en-US"/>
               <a:t>Fourth level</a:t>
             </a:r>
           </a:p>
           <a:p>
             <a:pPr lvl="4"/>
             <a:r>
-              <a:rPr lang="en-US" smtClean="0"/>
+              <a:rPr lang="en-US"/>
               <a:t>Fifth level</a:t>
             </a:r>
             <a:endParaRPr lang="en-US" dirty="0"/>
@@ -7240,7 +7330,7 @@
             <a:fld id="{B61BEF0D-F0BB-DE4B-95CE-6DB70DBA9567}" type="datetimeFigureOut">
               <a:rPr lang="en-US" dirty="0"/>
               <a:pPr/>
-              <a:t>12/5/17</a:t>
+              <a:t>12/5/2017</a:t>
             </a:fld>
             <a:endParaRPr lang="en-US" dirty="0"/>
           </a:p>
@@ -7823,7 +7913,7 @@
           <a:lstStyle/>
           <a:p>
             <a:r>
-              <a:rPr lang="en-US" sz="2000" dirty="0" smtClean="0">
+              <a:rPr lang="en-US" sz="2000" dirty="0">
                 <a:latin typeface="Times New Roman" charset="0"/>
                 <a:ea typeface="Times New Roman" charset="0"/>
                 <a:cs typeface="Times New Roman" charset="0"/>
@@ -7833,7 +7923,7 @@
           </a:p>
           <a:p>
             <a:r>
-              <a:rPr lang="en-US" sz="2000" dirty="0" smtClean="0">
+              <a:rPr lang="en-US" sz="2000" dirty="0">
                 <a:latin typeface="Times New Roman" charset="0"/>
                 <a:ea typeface="Times New Roman" charset="0"/>
                 <a:cs typeface="Times New Roman" charset="0"/>
@@ -7883,54 +7973,93 @@
             <p:ph type="title"/>
           </p:nvPr>
         </p:nvSpPr>
-        <p:spPr/>
+        <p:spPr>
+          <a:xfrm>
+            <a:off x="1295401" y="898242"/>
+            <a:ext cx="9601196" cy="1303867"/>
+          </a:xfrm>
+        </p:spPr>
         <p:txBody>
           <a:bodyPr>
-            <a:normAutofit/>
+            <a:normAutofit fontScale="90000"/>
           </a:bodyPr>
           <a:lstStyle/>
           <a:p>
             <a:r>
-              <a:rPr lang="en-US" sz="3200" b="1" dirty="0" smtClean="0">
-                <a:latin typeface="Times New Roman" charset="0"/>
-                <a:ea typeface="Times New Roman" charset="0"/>
-                <a:cs typeface="Times New Roman" charset="0"/>
+              <a:rPr lang="en-US" b="1" dirty="0">
+                <a:latin typeface="Times New Roman" panose="02020603050405020304" pitchFamily="18" charset="0"/>
+                <a:cs typeface="Times New Roman" panose="02020603050405020304" pitchFamily="18" charset="0"/>
               </a:rPr>
-              <a:t>C4.5</a:t>
+              <a:t>Time to Generate Model</a:t>
+            </a:r>
+            <a:br>
+              <a:rPr lang="en-US" sz="3200" b="1" dirty="0">
+                <a:latin typeface="Times New Roman" panose="02020603050405020304" pitchFamily="18" charset="0"/>
+                <a:cs typeface="Times New Roman" panose="02020603050405020304" pitchFamily="18" charset="0"/>
+              </a:rPr>
+            </a:br>
+            <a:r>
+              <a:rPr lang="en-US" b="1" dirty="0">
+                <a:latin typeface="Times New Roman" panose="02020603050405020304" pitchFamily="18" charset="0"/>
+                <a:cs typeface="Times New Roman" panose="02020603050405020304" pitchFamily="18" charset="0"/>
+              </a:rPr>
+              <a:t>(CART / C4.5 / C5.0)​</a:t>
             </a:r>
             <a:endParaRPr lang="en-US" sz="3200" b="1" dirty="0">
-              <a:latin typeface="Times New Roman" charset="0"/>
+              <a:latin typeface="Times New Roman" panose="02020603050405020304" pitchFamily="18" charset="0"/>
               <a:ea typeface="Times New Roman" charset="0"/>
-              <a:cs typeface="Times New Roman" charset="0"/>
+              <a:cs typeface="Times New Roman" panose="02020603050405020304" pitchFamily="18" charset="0"/>
             </a:endParaRPr>
           </a:p>
         </p:txBody>
       </p:sp>
-      <p:sp>
-        <p:nvSpPr>
-          <p:cNvPr id="3" name="Content Placeholder 2"/>
-          <p:cNvSpPr>
-            <a:spLocks noGrp="1"/>
-          </p:cNvSpPr>
-          <p:nvPr>
-            <p:ph idx="1"/>
-          </p:nvPr>
-        </p:nvSpPr>
-        <p:spPr/>
-        <p:txBody>
-          <a:bodyPr>
-            <a:normAutofit/>
-          </a:bodyPr>
-          <a:lstStyle/>
-          <a:p>
-            <a:endParaRPr lang="en-US" sz="2000" dirty="0">
-              <a:latin typeface="Times New Roman" charset="0"/>
-              <a:ea typeface="Times New Roman" charset="0"/>
-              <a:cs typeface="Times New Roman" charset="0"/>
-            </a:endParaRPr>
-          </a:p>
-        </p:txBody>
-      </p:sp>
+      <p:pic>
+        <p:nvPicPr>
+          <p:cNvPr id="2050" name="Picture 2" descr="https://lh5.googleusercontent.com/gN8PKgNyx437nRmN8EJ8NOUWwhe8UGZZjwFzWzK1VABAIYN52VCgt4jkoeVzlocO0OvB-9mQV1dRseLL2FCOYSD_TP66ycdPyjdGPYdXd6CFmC8CAtImIwHg0PAZDsUPI9OFvyWn2vE">
+            <a:extLst>
+              <a:ext uri="{FF2B5EF4-FFF2-40B4-BE49-F238E27FC236}">
+                <a16:creationId xmlns:a16="http://schemas.microsoft.com/office/drawing/2014/main" id="{FB050460-CFBD-4A45-A93A-870CA9F115B7}"/>
+              </a:ext>
+            </a:extLst>
+          </p:cNvPr>
+          <p:cNvPicPr>
+            <a:picLocks noChangeAspect="1" noChangeArrowheads="1"/>
+          </p:cNvPicPr>
+          <p:nvPr/>
+        </p:nvPicPr>
+        <p:blipFill>
+          <a:blip r:embed="rId2">
+            <a:extLst>
+              <a:ext uri="{28A0092B-C50C-407E-A947-70E740481C1C}">
+                <a14:useLocalDpi xmlns:a14="http://schemas.microsoft.com/office/drawing/2010/main" val="0"/>
+              </a:ext>
+            </a:extLst>
+          </a:blip>
+          <a:srcRect/>
+          <a:stretch>
+            <a:fillRect/>
+          </a:stretch>
+        </p:blipFill>
+        <p:spPr bwMode="auto">
+          <a:xfrm>
+            <a:off x="2913713" y="2548876"/>
+            <a:ext cx="6364573" cy="3667198"/>
+          </a:xfrm>
+          <a:prstGeom prst="rect">
+            <a:avLst/>
+          </a:prstGeom>
+          <a:noFill/>
+          <a:extLst>
+            <a:ext uri="{909E8E84-426E-40DD-AFC4-6F175D3DCCD1}">
+              <a14:hiddenFill xmlns:a14="http://schemas.microsoft.com/office/drawing/2010/main">
+                <a:solidFill>
+                  <a:srgbClr val="FFFFFF"/>
+                </a:solidFill>
+              </a14:hiddenFill>
+            </a:ext>
+          </a:extLst>
+        </p:spPr>
+      </p:pic>
     </p:spTree>
     <p:extLst>
       <p:ext uri="{BB962C8B-B14F-4D97-AF65-F5344CB8AC3E}">
@@ -7971,7 +8100,12 @@
             <p:ph type="title"/>
           </p:nvPr>
         </p:nvSpPr>
-        <p:spPr/>
+        <p:spPr>
+          <a:xfrm>
+            <a:off x="1295401" y="898242"/>
+            <a:ext cx="9601196" cy="1303867"/>
+          </a:xfrm>
+        </p:spPr>
         <p:txBody>
           <a:bodyPr>
             <a:normAutofit/>
@@ -7979,18 +8113,117 @@
           <a:lstStyle/>
           <a:p>
             <a:r>
-              <a:rPr lang="en-US" sz="3200" b="1" dirty="0" smtClean="0">
+              <a:rPr lang="en-US" b="1" dirty="0">
+                <a:latin typeface="Times New Roman" panose="02020603050405020304" pitchFamily="18" charset="0"/>
+                <a:cs typeface="Times New Roman" panose="02020603050405020304" pitchFamily="18" charset="0"/>
+              </a:rPr>
+              <a:t>C5.0 Accuracy with Different Trial #’s</a:t>
+            </a:r>
+          </a:p>
+        </p:txBody>
+      </p:sp>
+      <p:pic>
+        <p:nvPicPr>
+          <p:cNvPr id="3076" name="Picture 4" descr="https://lh5.googleusercontent.com/v9dWsAW86XFJfbQCAiJq2UJbmDrOTipp0ly1gzpLKAI6JobYvjIOZK0bvTxyS9jcXkyVaYGiuD-rfAYedMyHkp6FazSZihJ5Y-guFjGZesYDlYOTZFx2E84a6Ze3rb4Tif2qRQWH3dg">
+            <a:extLst>
+              <a:ext uri="{FF2B5EF4-FFF2-40B4-BE49-F238E27FC236}">
+                <a16:creationId xmlns:a16="http://schemas.microsoft.com/office/drawing/2014/main" id="{08E4AAC5-2633-4A9C-B8F5-773437008381}"/>
+              </a:ext>
+            </a:extLst>
+          </p:cNvPr>
+          <p:cNvPicPr>
+            <a:picLocks noChangeAspect="1" noChangeArrowheads="1"/>
+          </p:cNvPicPr>
+          <p:nvPr/>
+        </p:nvPicPr>
+        <p:blipFill>
+          <a:blip r:embed="rId2">
+            <a:extLst>
+              <a:ext uri="{28A0092B-C50C-407E-A947-70E740481C1C}">
+                <a14:useLocalDpi xmlns:a14="http://schemas.microsoft.com/office/drawing/2010/main" val="0"/>
+              </a:ext>
+            </a:extLst>
+          </a:blip>
+          <a:srcRect/>
+          <a:stretch>
+            <a:fillRect/>
+          </a:stretch>
+        </p:blipFill>
+        <p:spPr bwMode="auto">
+          <a:xfrm>
+            <a:off x="2789750" y="2493818"/>
+            <a:ext cx="6612497" cy="3745345"/>
+          </a:xfrm>
+          <a:prstGeom prst="rect">
+            <a:avLst/>
+          </a:prstGeom>
+          <a:noFill/>
+          <a:extLst>
+            <a:ext uri="{909E8E84-426E-40DD-AFC4-6F175D3DCCD1}">
+              <a14:hiddenFill xmlns:a14="http://schemas.microsoft.com/office/drawing/2010/main">
+                <a:solidFill>
+                  <a:srgbClr val="FFFFFF"/>
+                </a:solidFill>
+              </a14:hiddenFill>
+            </a:ext>
+          </a:extLst>
+        </p:spPr>
+      </p:pic>
+    </p:spTree>
+    <p:extLst>
+      <p:ext uri="{BB962C8B-B14F-4D97-AF65-F5344CB8AC3E}">
+        <p14:creationId xmlns:p14="http://schemas.microsoft.com/office/powerpoint/2010/main" val="2794925831"/>
+      </p:ext>
+    </p:extLst>
+  </p:cSld>
+  <p:clrMapOvr>
+    <a:masterClrMapping/>
+  </p:clrMapOvr>
+</p:sld>
+</file>
+
+<file path=ppt/slides/slide12.xml><?xml version="1.0" encoding="utf-8"?>
+<p:sld xmlns:a="http://schemas.openxmlformats.org/drawingml/2006/main" xmlns:r="http://schemas.openxmlformats.org/officeDocument/2006/relationships" xmlns:p="http://schemas.openxmlformats.org/presentationml/2006/main">
+  <p:cSld>
+    <p:spTree>
+      <p:nvGrpSpPr>
+        <p:cNvPr id="1" name=""/>
+        <p:cNvGrpSpPr/>
+        <p:nvPr/>
+      </p:nvGrpSpPr>
+      <p:grpSpPr>
+        <a:xfrm>
+          <a:off x="0" y="0"/>
+          <a:ext cx="0" cy="0"/>
+          <a:chOff x="0" y="0"/>
+          <a:chExt cx="0" cy="0"/>
+        </a:xfrm>
+      </p:grpSpPr>
+      <p:sp>
+        <p:nvSpPr>
+          <p:cNvPr id="2" name="Title 1"/>
+          <p:cNvSpPr>
+            <a:spLocks noGrp="1"/>
+          </p:cNvSpPr>
+          <p:nvPr>
+            <p:ph type="title"/>
+          </p:nvPr>
+        </p:nvSpPr>
+        <p:spPr/>
+        <p:txBody>
+          <a:bodyPr>
+            <a:normAutofit/>
+          </a:bodyPr>
+          <a:lstStyle/>
+          <a:p>
+            <a:r>
+              <a:rPr lang="en-US" sz="3200" b="1" dirty="0">
                 <a:latin typeface="Times New Roman" charset="0"/>
                 <a:ea typeface="Times New Roman" charset="0"/>
                 <a:cs typeface="Times New Roman" charset="0"/>
               </a:rPr>
               <a:t>The K’s  - KNN, KKNN &amp; KMEANS</a:t>
             </a:r>
-            <a:endParaRPr lang="en-US" sz="3200" b="1" dirty="0">
-              <a:latin typeface="Times New Roman" charset="0"/>
-              <a:ea typeface="Times New Roman" charset="0"/>
-              <a:cs typeface="Times New Roman" charset="0"/>
-            </a:endParaRPr>
           </a:p>
         </p:txBody>
       </p:sp>
@@ -8020,8 +8253,20 @@
                 <a:tableStyleId>{93296810-A885-4BE3-A3E7-6D5BEEA58F35}</a:tableStyleId>
               </a:tblPr>
               <a:tblGrid>
-                <a:gridCol w="4800600"/>
-                <a:gridCol w="4800600"/>
+                <a:gridCol w="4800600">
+                  <a:extLst>
+                    <a:ext uri="{9D8B030D-6E8A-4147-A177-3AD203B41FA5}">
+                      <a16:colId xmlns:a16="http://schemas.microsoft.com/office/drawing/2014/main" val="20000"/>
+                    </a:ext>
+                  </a:extLst>
+                </a:gridCol>
+                <a:gridCol w="4800600">
+                  <a:extLst>
+                    <a:ext uri="{9D8B030D-6E8A-4147-A177-3AD203B41FA5}">
+                      <a16:colId xmlns:a16="http://schemas.microsoft.com/office/drawing/2014/main" val="20001"/>
+                    </a:ext>
+                  </a:extLst>
+                </a:gridCol>
               </a:tblGrid>
               <a:tr h="370840">
                 <a:tc>
@@ -8030,18 +8275,13 @@
                     <a:lstStyle/>
                     <a:p>
                       <a:r>
-                        <a:rPr lang="en-US" sz="2000" dirty="0" smtClean="0">
+                        <a:rPr lang="en-US" sz="2000" dirty="0">
                           <a:latin typeface="Times New Roman" charset="0"/>
                           <a:ea typeface="Times New Roman" charset="0"/>
                           <a:cs typeface="Times New Roman" charset="0"/>
                         </a:rPr>
                         <a:t>Results</a:t>
                       </a:r>
-                      <a:endParaRPr lang="en-US" sz="2000" dirty="0">
-                        <a:latin typeface="Times New Roman" charset="0"/>
-                        <a:ea typeface="Times New Roman" charset="0"/>
-                        <a:cs typeface="Times New Roman" charset="0"/>
-                      </a:endParaRPr>
                     </a:p>
                   </a:txBody>
                   <a:tcPr/>
@@ -8060,6 +8300,11 @@
                   </a:txBody>
                   <a:tcPr/>
                 </a:tc>
+                <a:extLst>
+                  <a:ext uri="{0D108BD9-81ED-4DB2-BD59-A6C34878D82A}">
+                    <a16:rowId xmlns:a16="http://schemas.microsoft.com/office/drawing/2014/main" val="10000"/>
+                  </a:ext>
+                </a:extLst>
               </a:tr>
               <a:tr h="370840">
                 <a:tc>
@@ -8068,18 +8313,13 @@
                     <a:lstStyle/>
                     <a:p>
                       <a:r>
-                        <a:rPr lang="en-US" sz="2000" dirty="0" smtClean="0">
+                        <a:rPr lang="en-US" sz="2000" dirty="0">
                           <a:latin typeface="Times New Roman" charset="0"/>
                           <a:ea typeface="Times New Roman" charset="0"/>
                           <a:cs typeface="Times New Roman" charset="0"/>
                         </a:rPr>
                         <a:t>KNN (k=5)</a:t>
                       </a:r>
-                      <a:endParaRPr lang="en-US" sz="2000" dirty="0">
-                        <a:latin typeface="Times New Roman" charset="0"/>
-                        <a:ea typeface="Times New Roman" charset="0"/>
-                        <a:cs typeface="Times New Roman" charset="0"/>
-                      </a:endParaRPr>
                     </a:p>
                   </a:txBody>
                   <a:tcPr/>
@@ -8107,7 +8347,7 @@
                         <a:defRPr/>
                       </a:pPr>
                       <a:r>
-                        <a:rPr lang="en-US" sz="2000" dirty="0" smtClean="0">
+                        <a:rPr lang="en-US" sz="2000" dirty="0">
                           <a:latin typeface="Times New Roman" charset="0"/>
                           <a:ea typeface="Times New Roman" charset="0"/>
                           <a:cs typeface="Times New Roman" charset="0"/>
@@ -8115,7 +8355,7 @@
                         <a:t>0.3309758 (With almost</a:t>
                       </a:r>
                       <a:r>
-                        <a:rPr lang="en-US" sz="2000" baseline="0" dirty="0" smtClean="0">
+                        <a:rPr lang="en-US" sz="2000" baseline="0" dirty="0">
                           <a:latin typeface="Times New Roman" charset="0"/>
                           <a:ea typeface="Times New Roman" charset="0"/>
                           <a:cs typeface="Times New Roman" charset="0"/>
@@ -8123,7 +8363,7 @@
                         <a:t> all</a:t>
                       </a:r>
                       <a:r>
-                        <a:rPr lang="en-US" sz="2000" dirty="0" smtClean="0">
+                        <a:rPr lang="en-US" sz="2000" dirty="0">
                           <a:latin typeface="Times New Roman" charset="0"/>
                           <a:ea typeface="Times New Roman" charset="0"/>
                           <a:cs typeface="Times New Roman" charset="0"/>
@@ -8134,6 +8374,11 @@
                   </a:txBody>
                   <a:tcPr/>
                 </a:tc>
+                <a:extLst>
+                  <a:ext uri="{0D108BD9-81ED-4DB2-BD59-A6C34878D82A}">
+                    <a16:rowId xmlns:a16="http://schemas.microsoft.com/office/drawing/2014/main" val="10001"/>
+                  </a:ext>
+                </a:extLst>
               </a:tr>
               <a:tr h="370840">
                 <a:tc>
@@ -8142,18 +8387,13 @@
                     <a:lstStyle/>
                     <a:p>
                       <a:r>
-                        <a:rPr lang="en-US" sz="2000" dirty="0" smtClean="0">
+                        <a:rPr lang="en-US" sz="2000" dirty="0">
                           <a:latin typeface="Times New Roman" charset="0"/>
                           <a:ea typeface="Times New Roman" charset="0"/>
                           <a:cs typeface="Times New Roman" charset="0"/>
                         </a:rPr>
                         <a:t>KNN (K=25)</a:t>
                       </a:r>
-                      <a:endParaRPr lang="en-US" sz="2000" dirty="0">
-                        <a:latin typeface="Times New Roman" charset="0"/>
-                        <a:ea typeface="Times New Roman" charset="0"/>
-                        <a:cs typeface="Times New Roman" charset="0"/>
-                      </a:endParaRPr>
                     </a:p>
                   </a:txBody>
                   <a:tcPr/>
@@ -8181,7 +8421,7 @@
                         <a:defRPr/>
                       </a:pPr>
                       <a:r>
-                        <a:rPr lang="en-US" sz="2000" dirty="0" smtClean="0">
+                        <a:rPr lang="en-US" sz="2000" dirty="0">
                           <a:latin typeface="Times New Roman" charset="0"/>
                           <a:ea typeface="Times New Roman" charset="0"/>
                           <a:cs typeface="Times New Roman" charset="0"/>
@@ -8189,7 +8429,7 @@
                         <a:t>0.3608655 (With almost</a:t>
                       </a:r>
                       <a:r>
-                        <a:rPr lang="en-US" sz="2000" baseline="0" dirty="0" smtClean="0">
+                        <a:rPr lang="en-US" sz="2000" baseline="0" dirty="0">
                           <a:latin typeface="Times New Roman" charset="0"/>
                           <a:ea typeface="Times New Roman" charset="0"/>
                           <a:cs typeface="Times New Roman" charset="0"/>
@@ -8197,7 +8437,7 @@
                         <a:t> all</a:t>
                       </a:r>
                       <a:r>
-                        <a:rPr lang="en-US" sz="2000" dirty="0" smtClean="0">
+                        <a:rPr lang="en-US" sz="2000" dirty="0">
                           <a:latin typeface="Times New Roman" charset="0"/>
                           <a:ea typeface="Times New Roman" charset="0"/>
                           <a:cs typeface="Times New Roman" charset="0"/>
@@ -8208,6 +8448,11 @@
                   </a:txBody>
                   <a:tcPr/>
                 </a:tc>
+                <a:extLst>
+                  <a:ext uri="{0D108BD9-81ED-4DB2-BD59-A6C34878D82A}">
+                    <a16:rowId xmlns:a16="http://schemas.microsoft.com/office/drawing/2014/main" val="10002"/>
+                  </a:ext>
+                </a:extLst>
               </a:tr>
               <a:tr h="370840">
                 <a:tc>
@@ -8216,18 +8461,13 @@
                     <a:lstStyle/>
                     <a:p>
                       <a:r>
-                        <a:rPr lang="en-US" sz="2000" dirty="0" smtClean="0">
+                        <a:rPr lang="en-US" sz="2000" dirty="0">
                           <a:latin typeface="Times New Roman" charset="0"/>
                           <a:ea typeface="Times New Roman" charset="0"/>
                           <a:cs typeface="Times New Roman" charset="0"/>
                         </a:rPr>
                         <a:t>KNN (K=25)</a:t>
                       </a:r>
-                      <a:endParaRPr lang="en-US" sz="2000" dirty="0">
-                        <a:latin typeface="Times New Roman" charset="0"/>
-                        <a:ea typeface="Times New Roman" charset="0"/>
-                        <a:cs typeface="Times New Roman" charset="0"/>
-                      </a:endParaRPr>
                     </a:p>
                   </a:txBody>
                   <a:tcPr/>
@@ -8238,22 +8478,22 @@
                     <a:lstStyle/>
                     <a:p>
                       <a:r>
-                        <a:rPr lang="en-US" sz="2000" dirty="0" smtClean="0">
+                        <a:rPr lang="en-US" sz="2000" dirty="0">
                           <a:latin typeface="Times New Roman" charset="0"/>
                           <a:ea typeface="Times New Roman" charset="0"/>
                           <a:cs typeface="Times New Roman" charset="0"/>
                         </a:rPr>
                         <a:t>0.3615391 (With partial columns)</a:t>
                       </a:r>
-                      <a:endParaRPr lang="en-US" sz="2000" dirty="0">
-                        <a:latin typeface="Times New Roman" charset="0"/>
-                        <a:ea typeface="Times New Roman" charset="0"/>
-                        <a:cs typeface="Times New Roman" charset="0"/>
-                      </a:endParaRPr>
                     </a:p>
                   </a:txBody>
                   <a:tcPr/>
                 </a:tc>
+                <a:extLst>
+                  <a:ext uri="{0D108BD9-81ED-4DB2-BD59-A6C34878D82A}">
+                    <a16:rowId xmlns:a16="http://schemas.microsoft.com/office/drawing/2014/main" val="10003"/>
+                  </a:ext>
+                </a:extLst>
               </a:tr>
               <a:tr h="370840">
                 <a:tc>
@@ -8262,18 +8502,13 @@
                     <a:lstStyle/>
                     <a:p>
                       <a:r>
-                        <a:rPr lang="en-US" sz="2000" dirty="0" smtClean="0">
+                        <a:rPr lang="en-US" sz="2000" dirty="0">
                           <a:latin typeface="Times New Roman" charset="0"/>
                           <a:ea typeface="Times New Roman" charset="0"/>
                           <a:cs typeface="Times New Roman" charset="0"/>
                         </a:rPr>
                         <a:t>KKNN (K=25)</a:t>
                       </a:r>
-                      <a:endParaRPr lang="en-US" sz="2000" dirty="0">
-                        <a:latin typeface="Times New Roman" charset="0"/>
-                        <a:ea typeface="Times New Roman" charset="0"/>
-                        <a:cs typeface="Times New Roman" charset="0"/>
-                      </a:endParaRPr>
                     </a:p>
                   </a:txBody>
                   <a:tcPr/>
@@ -8301,7 +8536,7 @@
                         <a:defRPr/>
                       </a:pPr>
                       <a:r>
-                        <a:rPr lang="en-US" sz="2000" dirty="0" smtClean="0">
+                        <a:rPr lang="en-US" sz="2000" dirty="0">
                           <a:latin typeface="Times New Roman" charset="0"/>
                           <a:ea typeface="Times New Roman" charset="0"/>
                           <a:cs typeface="Times New Roman" charset="0"/>
@@ -8309,7 +8544,7 @@
                         <a:t>0.424097 (With almost</a:t>
                       </a:r>
                       <a:r>
-                        <a:rPr lang="en-US" sz="2000" baseline="0" dirty="0" smtClean="0">
+                        <a:rPr lang="en-US" sz="2000" baseline="0" dirty="0">
                           <a:latin typeface="Times New Roman" charset="0"/>
                           <a:ea typeface="Times New Roman" charset="0"/>
                           <a:cs typeface="Times New Roman" charset="0"/>
@@ -8317,7 +8552,7 @@
                         <a:t> all</a:t>
                       </a:r>
                       <a:r>
-                        <a:rPr lang="en-US" sz="2000" dirty="0" smtClean="0">
+                        <a:rPr lang="en-US" sz="2000" dirty="0">
                           <a:latin typeface="Times New Roman" charset="0"/>
                           <a:ea typeface="Times New Roman" charset="0"/>
                           <a:cs typeface="Times New Roman" charset="0"/>
@@ -8328,6 +8563,11 @@
                   </a:txBody>
                   <a:tcPr/>
                 </a:tc>
+                <a:extLst>
+                  <a:ext uri="{0D108BD9-81ED-4DB2-BD59-A6C34878D82A}">
+                    <a16:rowId xmlns:a16="http://schemas.microsoft.com/office/drawing/2014/main" val="10004"/>
+                  </a:ext>
+                </a:extLst>
               </a:tr>
               <a:tr h="370840">
                 <a:tc>
@@ -8336,18 +8576,13 @@
                     <a:lstStyle/>
                     <a:p>
                       <a:r>
-                        <a:rPr lang="en-US" sz="2000" dirty="0" smtClean="0">
+                        <a:rPr lang="en-US" sz="2000" dirty="0">
                           <a:latin typeface="Times New Roman" charset="0"/>
                           <a:ea typeface="Times New Roman" charset="0"/>
                           <a:cs typeface="Times New Roman" charset="0"/>
                         </a:rPr>
                         <a:t>KKNN (K=25)</a:t>
                       </a:r>
-                      <a:endParaRPr lang="en-US" sz="2000" dirty="0">
-                        <a:latin typeface="Times New Roman" charset="0"/>
-                        <a:ea typeface="Times New Roman" charset="0"/>
-                        <a:cs typeface="Times New Roman" charset="0"/>
-                      </a:endParaRPr>
                     </a:p>
                   </a:txBody>
                   <a:tcPr/>
@@ -8358,22 +8593,22 @@
                     <a:lstStyle/>
                     <a:p>
                       <a:r>
-                        <a:rPr lang="en-US" sz="2000" dirty="0" smtClean="0">
+                        <a:rPr lang="en-US" sz="2000" dirty="0">
                           <a:latin typeface="Times New Roman" charset="0"/>
                           <a:ea typeface="Times New Roman" charset="0"/>
                           <a:cs typeface="Times New Roman" charset="0"/>
                         </a:rPr>
                         <a:t>0.4208975 (With partial columns)</a:t>
                       </a:r>
-                      <a:endParaRPr lang="en-US" sz="2000" dirty="0">
-                        <a:latin typeface="Times New Roman" charset="0"/>
-                        <a:ea typeface="Times New Roman" charset="0"/>
-                        <a:cs typeface="Times New Roman" charset="0"/>
-                      </a:endParaRPr>
                     </a:p>
                   </a:txBody>
                   <a:tcPr/>
                 </a:tc>
+                <a:extLst>
+                  <a:ext uri="{0D108BD9-81ED-4DB2-BD59-A6C34878D82A}">
+                    <a16:rowId xmlns:a16="http://schemas.microsoft.com/office/drawing/2014/main" val="10005"/>
+                  </a:ext>
+                </a:extLst>
               </a:tr>
               <a:tr h="370840">
                 <a:tc>
@@ -8382,18 +8617,13 @@
                     <a:lstStyle/>
                     <a:p>
                       <a:r>
-                        <a:rPr lang="en-US" sz="2000" dirty="0" smtClean="0">
+                        <a:rPr lang="en-US" sz="2000" dirty="0">
                           <a:latin typeface="Times New Roman" charset="0"/>
                           <a:ea typeface="Times New Roman" charset="0"/>
                           <a:cs typeface="Times New Roman" charset="0"/>
                         </a:rPr>
                         <a:t>KMEANS</a:t>
                       </a:r>
-                      <a:endParaRPr lang="en-US" sz="2000" dirty="0">
-                        <a:latin typeface="Times New Roman" charset="0"/>
-                        <a:ea typeface="Times New Roman" charset="0"/>
-                        <a:cs typeface="Times New Roman" charset="0"/>
-                      </a:endParaRPr>
                     </a:p>
                   </a:txBody>
                   <a:tcPr/>
@@ -8421,7 +8651,7 @@
                         <a:defRPr/>
                       </a:pPr>
                       <a:r>
-                        <a:rPr lang="en-US" sz="2000" dirty="0" smtClean="0">
+                        <a:rPr lang="en-US" sz="2000" dirty="0">
                           <a:latin typeface="Times New Roman" charset="0"/>
                           <a:ea typeface="Times New Roman" charset="0"/>
                           <a:cs typeface="Times New Roman" charset="0"/>
@@ -8429,7 +8659,7 @@
                         <a:t>0.114928 (With almost</a:t>
                       </a:r>
                       <a:r>
-                        <a:rPr lang="en-US" sz="2000" baseline="0" dirty="0" smtClean="0">
+                        <a:rPr lang="en-US" sz="2000" baseline="0" dirty="0">
                           <a:latin typeface="Times New Roman" charset="0"/>
                           <a:ea typeface="Times New Roman" charset="0"/>
                           <a:cs typeface="Times New Roman" charset="0"/>
@@ -8437,7 +8667,7 @@
                         <a:t> all</a:t>
                       </a:r>
                       <a:r>
-                        <a:rPr lang="en-US" sz="2000" dirty="0" smtClean="0">
+                        <a:rPr lang="en-US" sz="2000" dirty="0">
                           <a:latin typeface="Times New Roman" charset="0"/>
                           <a:ea typeface="Times New Roman" charset="0"/>
                           <a:cs typeface="Times New Roman" charset="0"/>
@@ -8448,6 +8678,11 @@
                   </a:txBody>
                   <a:tcPr/>
                 </a:tc>
+                <a:extLst>
+                  <a:ext uri="{0D108BD9-81ED-4DB2-BD59-A6C34878D82A}">
+                    <a16:rowId xmlns:a16="http://schemas.microsoft.com/office/drawing/2014/main" val="10006"/>
+                  </a:ext>
+                </a:extLst>
               </a:tr>
               <a:tr h="370840">
                 <a:tc>
@@ -8456,18 +8691,13 @@
                     <a:lstStyle/>
                     <a:p>
                       <a:r>
-                        <a:rPr lang="en-US" sz="2000" dirty="0" smtClean="0">
+                        <a:rPr lang="en-US" sz="2000" dirty="0">
                           <a:latin typeface="Times New Roman" charset="0"/>
                           <a:ea typeface="Times New Roman" charset="0"/>
                           <a:cs typeface="Times New Roman" charset="0"/>
                         </a:rPr>
                         <a:t>KMEANS</a:t>
                       </a:r>
-                      <a:endParaRPr lang="en-US" sz="2000" dirty="0">
-                        <a:latin typeface="Times New Roman" charset="0"/>
-                        <a:ea typeface="Times New Roman" charset="0"/>
-                        <a:cs typeface="Times New Roman" charset="0"/>
-                      </a:endParaRPr>
                     </a:p>
                   </a:txBody>
                   <a:tcPr/>
@@ -8495,7 +8725,7 @@
                         <a:defRPr/>
                       </a:pPr>
                       <a:r>
-                        <a:rPr lang="en-US" sz="2000" dirty="0" smtClean="0">
+                        <a:rPr lang="en-US" sz="2000" dirty="0">
                           <a:latin typeface="Times New Roman" charset="0"/>
                           <a:ea typeface="Times New Roman" charset="0"/>
                           <a:cs typeface="Times New Roman" charset="0"/>
@@ -8503,7 +8733,7 @@
                         <a:t> 0.1336196(With almost</a:t>
                       </a:r>
                       <a:r>
-                        <a:rPr lang="en-US" sz="2000" baseline="0" dirty="0" smtClean="0">
+                        <a:rPr lang="en-US" sz="2000" baseline="0" dirty="0">
                           <a:latin typeface="Times New Roman" charset="0"/>
                           <a:ea typeface="Times New Roman" charset="0"/>
                           <a:cs typeface="Times New Roman" charset="0"/>
@@ -8511,7 +8741,7 @@
                         <a:t> all</a:t>
                       </a:r>
                       <a:r>
-                        <a:rPr lang="en-US" sz="2000" dirty="0" smtClean="0">
+                        <a:rPr lang="en-US" sz="2000" dirty="0">
                           <a:latin typeface="Times New Roman" charset="0"/>
                           <a:ea typeface="Times New Roman" charset="0"/>
                           <a:cs typeface="Times New Roman" charset="0"/>
@@ -8522,6 +8752,11 @@
                   </a:txBody>
                   <a:tcPr/>
                 </a:tc>
+                <a:extLst>
+                  <a:ext uri="{0D108BD9-81ED-4DB2-BD59-A6C34878D82A}">
+                    <a16:rowId xmlns:a16="http://schemas.microsoft.com/office/drawing/2014/main" val="10007"/>
+                  </a:ext>
+                </a:extLst>
               </a:tr>
             </a:tbl>
           </a:graphicData>
@@ -8531,189 +8766,6 @@
     <p:extLst>
       <p:ext uri="{BB962C8B-B14F-4D97-AF65-F5344CB8AC3E}">
         <p14:creationId xmlns:p14="http://schemas.microsoft.com/office/powerpoint/2010/main" val="3257625273"/>
-      </p:ext>
-    </p:extLst>
-  </p:cSld>
-  <p:clrMapOvr>
-    <a:masterClrMapping/>
-  </p:clrMapOvr>
-</p:sld>
-</file>
-
-<file path=ppt/slides/slide12.xml><?xml version="1.0" encoding="utf-8"?>
-<p:sld xmlns:a="http://schemas.openxmlformats.org/drawingml/2006/main" xmlns:r="http://schemas.openxmlformats.org/officeDocument/2006/relationships" xmlns:p="http://schemas.openxmlformats.org/presentationml/2006/main">
-  <p:cSld>
-    <p:spTree>
-      <p:nvGrpSpPr>
-        <p:cNvPr id="1" name=""/>
-        <p:cNvGrpSpPr/>
-        <p:nvPr/>
-      </p:nvGrpSpPr>
-      <p:grpSpPr>
-        <a:xfrm>
-          <a:off x="0" y="0"/>
-          <a:ext cx="0" cy="0"/>
-          <a:chOff x="0" y="0"/>
-          <a:chExt cx="0" cy="0"/>
-        </a:xfrm>
-      </p:grpSpPr>
-      <p:sp>
-        <p:nvSpPr>
-          <p:cNvPr id="2" name="Title 1"/>
-          <p:cNvSpPr>
-            <a:spLocks noGrp="1"/>
-          </p:cNvSpPr>
-          <p:nvPr>
-            <p:ph type="title"/>
-          </p:nvPr>
-        </p:nvSpPr>
-        <p:spPr/>
-        <p:txBody>
-          <a:bodyPr>
-            <a:normAutofit/>
-          </a:bodyPr>
-          <a:lstStyle/>
-          <a:p>
-            <a:r>
-              <a:rPr lang="en-US" sz="3200" b="1" dirty="0" smtClean="0">
-                <a:latin typeface="Times New Roman" charset="0"/>
-                <a:ea typeface="Times New Roman" charset="0"/>
-                <a:cs typeface="Times New Roman" charset="0"/>
-              </a:rPr>
-              <a:t>Random Forest</a:t>
-            </a:r>
-            <a:endParaRPr lang="en-US" sz="3200" b="1" dirty="0">
-              <a:latin typeface="Times New Roman" charset="0"/>
-              <a:ea typeface="Times New Roman" charset="0"/>
-              <a:cs typeface="Times New Roman" charset="0"/>
-            </a:endParaRPr>
-          </a:p>
-        </p:txBody>
-      </p:sp>
-      <p:sp>
-        <p:nvSpPr>
-          <p:cNvPr id="3" name="Content Placeholder 2"/>
-          <p:cNvSpPr>
-            <a:spLocks noGrp="1"/>
-          </p:cNvSpPr>
-          <p:nvPr>
-            <p:ph idx="1"/>
-          </p:nvPr>
-        </p:nvSpPr>
-        <p:spPr/>
-        <p:txBody>
-          <a:bodyPr>
-            <a:normAutofit/>
-          </a:bodyPr>
-          <a:lstStyle/>
-          <a:p>
-            <a:r>
-              <a:rPr lang="en-US" sz="2000" dirty="0" smtClean="0">
-                <a:latin typeface="Times New Roman" charset="0"/>
-                <a:ea typeface="Times New Roman" charset="0"/>
-                <a:cs typeface="Times New Roman" charset="0"/>
-              </a:rPr>
-              <a:t>Fits a number of decision tree classifiers</a:t>
-            </a:r>
-          </a:p>
-          <a:p>
-            <a:r>
-              <a:rPr lang="en-US" sz="2000" dirty="0" smtClean="0">
-                <a:latin typeface="Times New Roman" charset="0"/>
-                <a:ea typeface="Times New Roman" charset="0"/>
-                <a:cs typeface="Times New Roman" charset="0"/>
-              </a:rPr>
-              <a:t>Uses averaging to improve predictive accuracy</a:t>
-            </a:r>
-          </a:p>
-          <a:p>
-            <a:r>
-              <a:rPr lang="en-US" sz="2000" dirty="0" smtClean="0">
-                <a:latin typeface="Times New Roman" charset="0"/>
-                <a:ea typeface="Times New Roman" charset="0"/>
-                <a:cs typeface="Times New Roman" charset="0"/>
-              </a:rPr>
-              <a:t>Controls Overfitting</a:t>
-            </a:r>
-          </a:p>
-          <a:p>
-            <a:r>
-              <a:rPr lang="en-US" sz="2000" dirty="0" smtClean="0">
-                <a:latin typeface="Times New Roman" charset="0"/>
-                <a:ea typeface="Times New Roman" charset="0"/>
-                <a:cs typeface="Times New Roman" charset="0"/>
-              </a:rPr>
-              <a:t>Parameter Fine Tuning</a:t>
-            </a:r>
-          </a:p>
-          <a:p>
-            <a:pPr lvl="1"/>
-            <a:r>
-              <a:rPr lang="en-US" sz="1800" dirty="0" err="1" smtClean="0">
-                <a:latin typeface="Times New Roman" charset="0"/>
-                <a:ea typeface="Times New Roman" charset="0"/>
-                <a:cs typeface="Times New Roman" charset="0"/>
-              </a:rPr>
-              <a:t>Ntree</a:t>
-            </a:r>
-            <a:r>
-              <a:rPr lang="en-US" sz="1800" dirty="0" smtClean="0">
-                <a:latin typeface="Times New Roman" charset="0"/>
-                <a:ea typeface="Times New Roman" charset="0"/>
-                <a:cs typeface="Times New Roman" charset="0"/>
-              </a:rPr>
-              <a:t>(number of trees in the forest) = 500</a:t>
-            </a:r>
-          </a:p>
-          <a:p>
-            <a:pPr lvl="1"/>
-            <a:r>
-              <a:rPr lang="en-US" sz="1800" dirty="0" err="1" smtClean="0">
-                <a:latin typeface="Times New Roman" charset="0"/>
-                <a:ea typeface="Times New Roman" charset="0"/>
-                <a:cs typeface="Times New Roman" charset="0"/>
-              </a:rPr>
-              <a:t>Mtry</a:t>
-            </a:r>
-            <a:r>
-              <a:rPr lang="en-US" sz="1800" dirty="0" smtClean="0">
-                <a:latin typeface="Times New Roman" charset="0"/>
-                <a:ea typeface="Times New Roman" charset="0"/>
-                <a:cs typeface="Times New Roman" charset="0"/>
-              </a:rPr>
-              <a:t>(number of predictors sampled for splitting at each node)</a:t>
-            </a:r>
-          </a:p>
-          <a:p>
-            <a:pPr lvl="1"/>
-            <a:r>
-              <a:rPr lang="en-US" sz="1800" dirty="0" err="1" smtClean="0">
-                <a:latin typeface="Times New Roman" charset="0"/>
-                <a:ea typeface="Times New Roman" charset="0"/>
-                <a:cs typeface="Times New Roman" charset="0"/>
-              </a:rPr>
-              <a:t>Sampsize</a:t>
-            </a:r>
-            <a:r>
-              <a:rPr lang="en-US" sz="1800" dirty="0" smtClean="0">
-                <a:latin typeface="Times New Roman" charset="0"/>
-                <a:ea typeface="Times New Roman" charset="0"/>
-                <a:cs typeface="Times New Roman" charset="0"/>
-              </a:rPr>
-              <a:t>(size of the sample to draw)</a:t>
-            </a:r>
-            <a:endParaRPr lang="en-US" sz="1800" dirty="0">
-              <a:latin typeface="Times New Roman" charset="0"/>
-              <a:ea typeface="Times New Roman" charset="0"/>
-              <a:cs typeface="Times New Roman" charset="0"/>
-            </a:endParaRPr>
-          </a:p>
-        </p:txBody>
-      </p:sp>
-    </p:spTree>
-    <p:extLst>
-      <p:ext uri="{BB962C8B-B14F-4D97-AF65-F5344CB8AC3E}">
-        <p14:creationId xmlns:p14="http://schemas.microsoft.com/office/powerpoint/2010/main" val="372142708"/>
       </p:ext>
     </p:extLst>
   </p:cSld>
@@ -8758,7 +8810,180 @@
           <a:lstStyle/>
           <a:p>
             <a:r>
-              <a:rPr lang="en-US" sz="3200" b="1" dirty="0" smtClean="0">
+              <a:rPr lang="en-US" sz="3200" b="1" dirty="0">
+                <a:latin typeface="Times New Roman" charset="0"/>
+                <a:ea typeface="Times New Roman" charset="0"/>
+                <a:cs typeface="Times New Roman" charset="0"/>
+              </a:rPr>
+              <a:t>Random Forest</a:t>
+            </a:r>
+          </a:p>
+        </p:txBody>
+      </p:sp>
+      <p:sp>
+        <p:nvSpPr>
+          <p:cNvPr id="3" name="Content Placeholder 2"/>
+          <p:cNvSpPr>
+            <a:spLocks noGrp="1"/>
+          </p:cNvSpPr>
+          <p:nvPr>
+            <p:ph idx="1"/>
+          </p:nvPr>
+        </p:nvSpPr>
+        <p:spPr/>
+        <p:txBody>
+          <a:bodyPr>
+            <a:normAutofit/>
+          </a:bodyPr>
+          <a:lstStyle/>
+          <a:p>
+            <a:r>
+              <a:rPr lang="en-US" sz="2000" dirty="0">
+                <a:latin typeface="Times New Roman" charset="0"/>
+                <a:ea typeface="Times New Roman" charset="0"/>
+                <a:cs typeface="Times New Roman" charset="0"/>
+              </a:rPr>
+              <a:t>Fits a number of decision tree classifiers</a:t>
+            </a:r>
+          </a:p>
+          <a:p>
+            <a:r>
+              <a:rPr lang="en-US" sz="2000" dirty="0">
+                <a:latin typeface="Times New Roman" charset="0"/>
+                <a:ea typeface="Times New Roman" charset="0"/>
+                <a:cs typeface="Times New Roman" charset="0"/>
+              </a:rPr>
+              <a:t>Uses averaging to improve predictive accuracy</a:t>
+            </a:r>
+          </a:p>
+          <a:p>
+            <a:r>
+              <a:rPr lang="en-US" sz="2000" dirty="0">
+                <a:latin typeface="Times New Roman" charset="0"/>
+                <a:ea typeface="Times New Roman" charset="0"/>
+                <a:cs typeface="Times New Roman" charset="0"/>
+              </a:rPr>
+              <a:t>Controls Overfitting</a:t>
+            </a:r>
+          </a:p>
+          <a:p>
+            <a:r>
+              <a:rPr lang="en-US" sz="2000" dirty="0">
+                <a:latin typeface="Times New Roman" charset="0"/>
+                <a:ea typeface="Times New Roman" charset="0"/>
+                <a:cs typeface="Times New Roman" charset="0"/>
+              </a:rPr>
+              <a:t>Parameter Fine Tuning</a:t>
+            </a:r>
+          </a:p>
+          <a:p>
+            <a:pPr lvl="1"/>
+            <a:r>
+              <a:rPr lang="en-US" sz="1800" dirty="0" err="1">
+                <a:latin typeface="Times New Roman" charset="0"/>
+                <a:ea typeface="Times New Roman" charset="0"/>
+                <a:cs typeface="Times New Roman" charset="0"/>
+              </a:rPr>
+              <a:t>Ntree</a:t>
+            </a:r>
+            <a:r>
+              <a:rPr lang="en-US" sz="1800" dirty="0">
+                <a:latin typeface="Times New Roman" charset="0"/>
+                <a:ea typeface="Times New Roman" charset="0"/>
+                <a:cs typeface="Times New Roman" charset="0"/>
+              </a:rPr>
+              <a:t>(number of trees in the forest) = 500</a:t>
+            </a:r>
+          </a:p>
+          <a:p>
+            <a:pPr lvl="1"/>
+            <a:r>
+              <a:rPr lang="en-US" sz="1800" dirty="0" err="1">
+                <a:latin typeface="Times New Roman" charset="0"/>
+                <a:ea typeface="Times New Roman" charset="0"/>
+                <a:cs typeface="Times New Roman" charset="0"/>
+              </a:rPr>
+              <a:t>Mtry</a:t>
+            </a:r>
+            <a:r>
+              <a:rPr lang="en-US" sz="1800" dirty="0">
+                <a:latin typeface="Times New Roman" charset="0"/>
+                <a:ea typeface="Times New Roman" charset="0"/>
+                <a:cs typeface="Times New Roman" charset="0"/>
+              </a:rPr>
+              <a:t>(number of predictors sampled for splitting at each node)</a:t>
+            </a:r>
+          </a:p>
+          <a:p>
+            <a:pPr lvl="1"/>
+            <a:r>
+              <a:rPr lang="en-US" sz="1800" dirty="0" err="1">
+                <a:latin typeface="Times New Roman" charset="0"/>
+                <a:ea typeface="Times New Roman" charset="0"/>
+                <a:cs typeface="Times New Roman" charset="0"/>
+              </a:rPr>
+              <a:t>Sampsize</a:t>
+            </a:r>
+            <a:r>
+              <a:rPr lang="en-US" sz="1800" dirty="0">
+                <a:latin typeface="Times New Roman" charset="0"/>
+                <a:ea typeface="Times New Roman" charset="0"/>
+                <a:cs typeface="Times New Roman" charset="0"/>
+              </a:rPr>
+              <a:t>(size of the sample to draw)</a:t>
+            </a:r>
+          </a:p>
+        </p:txBody>
+      </p:sp>
+    </p:spTree>
+    <p:extLst>
+      <p:ext uri="{BB962C8B-B14F-4D97-AF65-F5344CB8AC3E}">
+        <p14:creationId xmlns:p14="http://schemas.microsoft.com/office/powerpoint/2010/main" val="372142708"/>
+      </p:ext>
+    </p:extLst>
+  </p:cSld>
+  <p:clrMapOvr>
+    <a:masterClrMapping/>
+  </p:clrMapOvr>
+</p:sld>
+</file>
+
+<file path=ppt/slides/slide14.xml><?xml version="1.0" encoding="utf-8"?>
+<p:sld xmlns:a="http://schemas.openxmlformats.org/drawingml/2006/main" xmlns:r="http://schemas.openxmlformats.org/officeDocument/2006/relationships" xmlns:p="http://schemas.openxmlformats.org/presentationml/2006/main">
+  <p:cSld>
+    <p:spTree>
+      <p:nvGrpSpPr>
+        <p:cNvPr id="1" name=""/>
+        <p:cNvGrpSpPr/>
+        <p:nvPr/>
+      </p:nvGrpSpPr>
+      <p:grpSpPr>
+        <a:xfrm>
+          <a:off x="0" y="0"/>
+          <a:ext cx="0" cy="0"/>
+          <a:chOff x="0" y="0"/>
+          <a:chExt cx="0" cy="0"/>
+        </a:xfrm>
+      </p:grpSpPr>
+      <p:sp>
+        <p:nvSpPr>
+          <p:cNvPr id="2" name="Title 1"/>
+          <p:cNvSpPr>
+            <a:spLocks noGrp="1"/>
+          </p:cNvSpPr>
+          <p:nvPr>
+            <p:ph type="title"/>
+          </p:nvPr>
+        </p:nvSpPr>
+        <p:spPr/>
+        <p:txBody>
+          <a:bodyPr>
+            <a:normAutofit/>
+          </a:bodyPr>
+          <a:lstStyle/>
+          <a:p>
+            <a:r>
+              <a:rPr lang="en-US" sz="3200" b="1" dirty="0">
                 <a:latin typeface="Times New Roman" charset="0"/>
                 <a:ea typeface="Times New Roman" charset="0"/>
                 <a:cs typeface="Times New Roman" charset="0"/>
@@ -8766,7 +8991,7 @@
               <a:t>Random Forest(Conti</a:t>
             </a:r>
             <a:r>
-              <a:rPr lang="mr-IN" sz="3200" b="1" dirty="0" smtClean="0">
+              <a:rPr lang="mr-IN" sz="3200" b="1" dirty="0">
                 <a:latin typeface="Times New Roman" charset="0"/>
                 <a:ea typeface="Times New Roman" charset="0"/>
                 <a:cs typeface="Times New Roman" charset="0"/>
@@ -8857,143 +9082,6 @@
 </p:sld>
 </file>
 
-<file path=ppt/slides/slide14.xml><?xml version="1.0" encoding="utf-8"?>
-<p:sld xmlns:a="http://schemas.openxmlformats.org/drawingml/2006/main" xmlns:r="http://schemas.openxmlformats.org/officeDocument/2006/relationships" xmlns:p="http://schemas.openxmlformats.org/presentationml/2006/main">
-  <p:cSld>
-    <p:spTree>
-      <p:nvGrpSpPr>
-        <p:cNvPr id="1" name=""/>
-        <p:cNvGrpSpPr/>
-        <p:nvPr/>
-      </p:nvGrpSpPr>
-      <p:grpSpPr>
-        <a:xfrm>
-          <a:off x="0" y="0"/>
-          <a:ext cx="0" cy="0"/>
-          <a:chOff x="0" y="0"/>
-          <a:chExt cx="0" cy="0"/>
-        </a:xfrm>
-      </p:grpSpPr>
-      <p:sp>
-        <p:nvSpPr>
-          <p:cNvPr id="2" name="Title 1"/>
-          <p:cNvSpPr>
-            <a:spLocks noGrp="1"/>
-          </p:cNvSpPr>
-          <p:nvPr>
-            <p:ph type="title"/>
-          </p:nvPr>
-        </p:nvSpPr>
-        <p:spPr/>
-        <p:txBody>
-          <a:bodyPr>
-            <a:normAutofit/>
-          </a:bodyPr>
-          <a:lstStyle/>
-          <a:p>
-            <a:r>
-              <a:rPr lang="en-US" sz="3200" b="1" dirty="0" smtClean="0">
-                <a:latin typeface="Times New Roman" charset="0"/>
-                <a:ea typeface="Times New Roman" charset="0"/>
-                <a:cs typeface="Times New Roman" charset="0"/>
-              </a:rPr>
-              <a:t>Logistic Regression</a:t>
-            </a:r>
-            <a:endParaRPr lang="en-US" sz="3200" b="1" dirty="0">
-              <a:latin typeface="Times New Roman" charset="0"/>
-              <a:ea typeface="Times New Roman" charset="0"/>
-              <a:cs typeface="Times New Roman" charset="0"/>
-            </a:endParaRPr>
-          </a:p>
-        </p:txBody>
-      </p:sp>
-      <p:sp>
-        <p:nvSpPr>
-          <p:cNvPr id="3" name="Content Placeholder 2"/>
-          <p:cNvSpPr>
-            <a:spLocks noGrp="1"/>
-          </p:cNvSpPr>
-          <p:nvPr>
-            <p:ph idx="1"/>
-          </p:nvPr>
-        </p:nvSpPr>
-        <p:spPr/>
-        <p:txBody>
-          <a:bodyPr>
-            <a:normAutofit/>
-          </a:bodyPr>
-          <a:lstStyle/>
-          <a:p>
-            <a:r>
-              <a:rPr lang="en-US" sz="2000" dirty="0" smtClean="0">
-                <a:latin typeface="Times New Roman" charset="0"/>
-                <a:ea typeface="Times New Roman" charset="0"/>
-                <a:cs typeface="Times New Roman" charset="0"/>
-              </a:rPr>
-              <a:t>Multinomial logistic regression</a:t>
-            </a:r>
-          </a:p>
-          <a:p>
-            <a:r>
-              <a:rPr lang="en-US" sz="2000" dirty="0" smtClean="0">
-                <a:latin typeface="Times New Roman" charset="0"/>
-                <a:ea typeface="Times New Roman" charset="0"/>
-                <a:cs typeface="Times New Roman" charset="0"/>
-              </a:rPr>
-              <a:t>Output is interpreted as probability</a:t>
-            </a:r>
-          </a:p>
-          <a:p>
-            <a:r>
-              <a:rPr lang="en-US" sz="2000" dirty="0" smtClean="0">
-                <a:latin typeface="Times New Roman" charset="0"/>
-                <a:ea typeface="Times New Roman" charset="0"/>
-                <a:cs typeface="Times New Roman" charset="0"/>
-              </a:rPr>
-              <a:t>Output is also interpreted as class</a:t>
-            </a:r>
-          </a:p>
-          <a:p>
-            <a:r>
-              <a:rPr lang="en-US" sz="2000" dirty="0" smtClean="0">
-                <a:latin typeface="Times New Roman" charset="0"/>
-                <a:ea typeface="Times New Roman" charset="0"/>
-                <a:cs typeface="Times New Roman" charset="0"/>
-              </a:rPr>
-              <a:t>Used </a:t>
-            </a:r>
-            <a:r>
-              <a:rPr lang="en-US" sz="2000" b="1" dirty="0" smtClean="0">
-                <a:latin typeface="Times New Roman" charset="0"/>
-                <a:ea typeface="Times New Roman" charset="0"/>
-                <a:cs typeface="Times New Roman" charset="0"/>
-              </a:rPr>
-              <a:t>nnet.multinom</a:t>
-            </a:r>
-            <a:r>
-              <a:rPr lang="en-US" sz="2000" dirty="0" smtClean="0">
-                <a:latin typeface="Times New Roman" charset="0"/>
-                <a:ea typeface="Times New Roman" charset="0"/>
-                <a:cs typeface="Times New Roman" charset="0"/>
-              </a:rPr>
-              <a:t> function</a:t>
-            </a:r>
-          </a:p>
-        </p:txBody>
-      </p:sp>
-    </p:spTree>
-    <p:extLst>
-      <p:ext uri="{BB962C8B-B14F-4D97-AF65-F5344CB8AC3E}">
-        <p14:creationId xmlns:p14="http://schemas.microsoft.com/office/powerpoint/2010/main" val="2362065278"/>
-      </p:ext>
-    </p:extLst>
-  </p:cSld>
-  <p:clrMapOvr>
-    <a:masterClrMapping/>
-  </p:clrMapOvr>
-</p:sld>
-</file>
-
 <file path=ppt/slides/slide15.xml><?xml version="1.0" encoding="utf-8"?>
 <p:sld xmlns:a="http://schemas.openxmlformats.org/drawingml/2006/main" xmlns:r="http://schemas.openxmlformats.org/officeDocument/2006/relationships" xmlns:p="http://schemas.openxmlformats.org/presentationml/2006/main">
   <p:cSld>
@@ -9029,7 +9117,139 @@
           <a:lstStyle/>
           <a:p>
             <a:r>
-              <a:rPr lang="en-US" sz="3200" b="1" dirty="0" smtClean="0">
+              <a:rPr lang="en-US" sz="3200" b="1" dirty="0">
+                <a:latin typeface="Times New Roman" charset="0"/>
+                <a:ea typeface="Times New Roman" charset="0"/>
+                <a:cs typeface="Times New Roman" charset="0"/>
+              </a:rPr>
+              <a:t>Logistic Regression</a:t>
+            </a:r>
+          </a:p>
+        </p:txBody>
+      </p:sp>
+      <p:sp>
+        <p:nvSpPr>
+          <p:cNvPr id="3" name="Content Placeholder 2"/>
+          <p:cNvSpPr>
+            <a:spLocks noGrp="1"/>
+          </p:cNvSpPr>
+          <p:nvPr>
+            <p:ph idx="1"/>
+          </p:nvPr>
+        </p:nvSpPr>
+        <p:spPr/>
+        <p:txBody>
+          <a:bodyPr>
+            <a:normAutofit/>
+          </a:bodyPr>
+          <a:lstStyle/>
+          <a:p>
+            <a:r>
+              <a:rPr lang="en-US" sz="2000" dirty="0">
+                <a:latin typeface="Times New Roman" charset="0"/>
+                <a:ea typeface="Times New Roman" charset="0"/>
+                <a:cs typeface="Times New Roman" charset="0"/>
+              </a:rPr>
+              <a:t>Multinomial logistic regression</a:t>
+            </a:r>
+          </a:p>
+          <a:p>
+            <a:r>
+              <a:rPr lang="en-US" sz="2000" dirty="0">
+                <a:latin typeface="Times New Roman" charset="0"/>
+                <a:ea typeface="Times New Roman" charset="0"/>
+                <a:cs typeface="Times New Roman" charset="0"/>
+              </a:rPr>
+              <a:t>Output is interpreted as probability</a:t>
+            </a:r>
+          </a:p>
+          <a:p>
+            <a:r>
+              <a:rPr lang="en-US" sz="2000" dirty="0">
+                <a:latin typeface="Times New Roman" charset="0"/>
+                <a:ea typeface="Times New Roman" charset="0"/>
+                <a:cs typeface="Times New Roman" charset="0"/>
+              </a:rPr>
+              <a:t>Output is also interpreted as class</a:t>
+            </a:r>
+          </a:p>
+          <a:p>
+            <a:r>
+              <a:rPr lang="en-US" sz="2000" dirty="0">
+                <a:latin typeface="Times New Roman" charset="0"/>
+                <a:ea typeface="Times New Roman" charset="0"/>
+                <a:cs typeface="Times New Roman" charset="0"/>
+              </a:rPr>
+              <a:t>Used </a:t>
+            </a:r>
+            <a:r>
+              <a:rPr lang="en-US" sz="2000" b="1" dirty="0">
+                <a:latin typeface="Times New Roman" charset="0"/>
+                <a:ea typeface="Times New Roman" charset="0"/>
+                <a:cs typeface="Times New Roman" charset="0"/>
+              </a:rPr>
+              <a:t>nnet.multinom</a:t>
+            </a:r>
+            <a:r>
+              <a:rPr lang="en-US" sz="2000" dirty="0">
+                <a:latin typeface="Times New Roman" charset="0"/>
+                <a:ea typeface="Times New Roman" charset="0"/>
+                <a:cs typeface="Times New Roman" charset="0"/>
+              </a:rPr>
+              <a:t> function</a:t>
+            </a:r>
+          </a:p>
+        </p:txBody>
+      </p:sp>
+    </p:spTree>
+    <p:extLst>
+      <p:ext uri="{BB962C8B-B14F-4D97-AF65-F5344CB8AC3E}">
+        <p14:creationId xmlns:p14="http://schemas.microsoft.com/office/powerpoint/2010/main" val="2362065278"/>
+      </p:ext>
+    </p:extLst>
+  </p:cSld>
+  <p:clrMapOvr>
+    <a:masterClrMapping/>
+  </p:clrMapOvr>
+</p:sld>
+</file>
+
+<file path=ppt/slides/slide16.xml><?xml version="1.0" encoding="utf-8"?>
+<p:sld xmlns:a="http://schemas.openxmlformats.org/drawingml/2006/main" xmlns:r="http://schemas.openxmlformats.org/officeDocument/2006/relationships" xmlns:p="http://schemas.openxmlformats.org/presentationml/2006/main">
+  <p:cSld>
+    <p:spTree>
+      <p:nvGrpSpPr>
+        <p:cNvPr id="1" name=""/>
+        <p:cNvGrpSpPr/>
+        <p:nvPr/>
+      </p:nvGrpSpPr>
+      <p:grpSpPr>
+        <a:xfrm>
+          <a:off x="0" y="0"/>
+          <a:ext cx="0" cy="0"/>
+          <a:chOff x="0" y="0"/>
+          <a:chExt cx="0" cy="0"/>
+        </a:xfrm>
+      </p:grpSpPr>
+      <p:sp>
+        <p:nvSpPr>
+          <p:cNvPr id="2" name="Title 1"/>
+          <p:cNvSpPr>
+            <a:spLocks noGrp="1"/>
+          </p:cNvSpPr>
+          <p:nvPr>
+            <p:ph type="title"/>
+          </p:nvPr>
+        </p:nvSpPr>
+        <p:spPr/>
+        <p:txBody>
+          <a:bodyPr>
+            <a:normAutofit/>
+          </a:bodyPr>
+          <a:lstStyle/>
+          <a:p>
+            <a:r>
+              <a:rPr lang="en-US" sz="3200" b="1" dirty="0">
                 <a:latin typeface="Times New Roman" charset="0"/>
                 <a:ea typeface="Times New Roman" charset="0"/>
                 <a:cs typeface="Times New Roman" charset="0"/>
@@ -9037,7 +9257,7 @@
               <a:t>Logistic Regression(Conti</a:t>
             </a:r>
             <a:r>
-              <a:rPr lang="mr-IN" sz="3200" b="1" dirty="0" smtClean="0">
+              <a:rPr lang="mr-IN" sz="3200" b="1" dirty="0">
                 <a:latin typeface="Times New Roman" charset="0"/>
                 <a:ea typeface="Times New Roman" charset="0"/>
                 <a:cs typeface="Times New Roman" charset="0"/>
@@ -9045,18 +9265,13 @@
               <a:t>…</a:t>
             </a:r>
             <a:r>
-              <a:rPr lang="en-US" sz="3200" b="1" dirty="0" smtClean="0">
+              <a:rPr lang="en-US" sz="3200" b="1" dirty="0">
                 <a:latin typeface="Times New Roman" charset="0"/>
                 <a:ea typeface="Times New Roman" charset="0"/>
                 <a:cs typeface="Times New Roman" charset="0"/>
               </a:rPr>
               <a:t>)</a:t>
             </a:r>
-            <a:endParaRPr lang="en-US" sz="3200" b="1" dirty="0">
-              <a:latin typeface="Times New Roman" charset="0"/>
-              <a:ea typeface="Times New Roman" charset="0"/>
-              <a:cs typeface="Times New Roman" charset="0"/>
-            </a:endParaRPr>
           </a:p>
         </p:txBody>
       </p:sp>
@@ -9133,7 +9348,7 @@
 </p:sld>
 </file>
 
-<file path=ppt/slides/slide16.xml><?xml version="1.0" encoding="utf-8"?>
+<file path=ppt/slides/slide17.xml><?xml version="1.0" encoding="utf-8"?>
 <p:sld xmlns:a="http://schemas.openxmlformats.org/drawingml/2006/main" xmlns:r="http://schemas.openxmlformats.org/officeDocument/2006/relationships" xmlns:p="http://schemas.openxmlformats.org/presentationml/2006/main">
   <p:cSld>
     <p:spTree>
@@ -9168,18 +9383,13 @@
           <a:lstStyle/>
           <a:p>
             <a:r>
-              <a:rPr lang="en-US" sz="3200" b="1" dirty="0" smtClean="0">
+              <a:rPr lang="en-US" sz="3200" b="1" dirty="0">
                 <a:latin typeface="Times New Roman" charset="0"/>
                 <a:ea typeface="Times New Roman" charset="0"/>
                 <a:cs typeface="Times New Roman" charset="0"/>
               </a:rPr>
               <a:t>Neural Networks</a:t>
             </a:r>
-            <a:endParaRPr lang="en-US" sz="3200" b="1" dirty="0">
-              <a:latin typeface="Times New Roman" charset="0"/>
-              <a:ea typeface="Times New Roman" charset="0"/>
-              <a:cs typeface="Times New Roman" charset="0"/>
-            </a:endParaRPr>
           </a:p>
         </p:txBody>
       </p:sp>
@@ -9206,7 +9416,7 @@
           <a:lstStyle/>
           <a:p>
             <a:r>
-              <a:rPr lang="en-US" sz="2000" dirty="0" smtClean="0">
+              <a:rPr lang="en-US" sz="2000" dirty="0">
                 <a:latin typeface="Times New Roman" charset="0"/>
                 <a:ea typeface="Times New Roman" charset="0"/>
                 <a:cs typeface="Times New Roman" charset="0"/>
@@ -9216,7 +9426,7 @@
           </a:p>
           <a:p>
             <a:r>
-              <a:rPr lang="en-US" sz="2000" dirty="0" smtClean="0">
+              <a:rPr lang="en-US" sz="2000" dirty="0">
                 <a:latin typeface="Times New Roman" charset="0"/>
                 <a:ea typeface="Times New Roman" charset="0"/>
                 <a:cs typeface="Times New Roman" charset="0"/>
@@ -9226,7 +9436,7 @@
           </a:p>
           <a:p>
             <a:r>
-              <a:rPr lang="en-US" sz="2000" dirty="0" smtClean="0">
+              <a:rPr lang="en-US" sz="2000" dirty="0">
                 <a:latin typeface="Times New Roman" charset="0"/>
                 <a:ea typeface="Times New Roman" charset="0"/>
                 <a:cs typeface="Times New Roman" charset="0"/>
@@ -9236,7 +9446,7 @@
           </a:p>
           <a:p>
             <a:r>
-              <a:rPr lang="en-US" sz="2000" dirty="0" smtClean="0">
+              <a:rPr lang="en-US" sz="2000" dirty="0">
                 <a:latin typeface="Times New Roman" charset="0"/>
                 <a:ea typeface="Times New Roman" charset="0"/>
                 <a:cs typeface="Times New Roman" charset="0"/>
@@ -9246,7 +9456,7 @@
           </a:p>
           <a:p>
             <a:r>
-              <a:rPr lang="en-US" sz="2000" dirty="0" smtClean="0">
+              <a:rPr lang="en-US" sz="2000" dirty="0">
                 <a:latin typeface="Times New Roman" charset="0"/>
                 <a:ea typeface="Times New Roman" charset="0"/>
                 <a:cs typeface="Times New Roman" charset="0"/>
@@ -9306,7 +9516,7 @@
 </p:sld>
 </file>
 
-<file path=ppt/slides/slide17.xml><?xml version="1.0" encoding="utf-8"?>
+<file path=ppt/slides/slide18.xml><?xml version="1.0" encoding="utf-8"?>
 <p:sld xmlns:a="http://schemas.openxmlformats.org/drawingml/2006/main" xmlns:r="http://schemas.openxmlformats.org/officeDocument/2006/relationships" xmlns:p="http://schemas.openxmlformats.org/presentationml/2006/main">
   <p:cSld>
     <p:spTree>
@@ -9377,7 +9587,7 @@
           <a:p>
             <a:pPr algn="ctr"/>
             <a:r>
-              <a:rPr lang="en-US" sz="3200" b="1" dirty="0" smtClean="0">
+              <a:rPr lang="en-US" sz="3200" b="1" dirty="0">
                 <a:latin typeface="Times New Roman" charset="0"/>
                 <a:ea typeface="Times New Roman" charset="0"/>
                 <a:cs typeface="Times New Roman" charset="0"/>
@@ -9385,7 +9595,7 @@
               <a:t>Neural Network(Conti</a:t>
             </a:r>
             <a:r>
-              <a:rPr lang="mr-IN" sz="3200" b="1" dirty="0" smtClean="0">
+              <a:rPr lang="mr-IN" sz="3200" b="1" dirty="0">
                 <a:latin typeface="Times New Roman" charset="0"/>
                 <a:ea typeface="Times New Roman" charset="0"/>
                 <a:cs typeface="Times New Roman" charset="0"/>
@@ -9393,18 +9603,13 @@
               <a:t>…</a:t>
             </a:r>
             <a:r>
-              <a:rPr lang="en-US" sz="3200" b="1" dirty="0" smtClean="0">
+              <a:rPr lang="en-US" sz="3200" b="1" dirty="0">
                 <a:latin typeface="Times New Roman" charset="0"/>
                 <a:ea typeface="Times New Roman" charset="0"/>
                 <a:cs typeface="Times New Roman" charset="0"/>
               </a:rPr>
               <a:t>)</a:t>
             </a:r>
-            <a:endParaRPr lang="en-US" sz="3200" b="1" dirty="0">
-              <a:latin typeface="Times New Roman" charset="0"/>
-              <a:ea typeface="Times New Roman" charset="0"/>
-              <a:cs typeface="Times New Roman" charset="0"/>
-            </a:endParaRPr>
           </a:p>
         </p:txBody>
       </p:sp>
@@ -9412,122 +9617,6 @@
     <p:extLst>
       <p:ext uri="{BB962C8B-B14F-4D97-AF65-F5344CB8AC3E}">
         <p14:creationId xmlns:p14="http://schemas.microsoft.com/office/powerpoint/2010/main" val="553782298"/>
-      </p:ext>
-    </p:extLst>
-  </p:cSld>
-  <p:clrMapOvr>
-    <a:masterClrMapping/>
-  </p:clrMapOvr>
-</p:sld>
-</file>
-
-<file path=ppt/slides/slide18.xml><?xml version="1.0" encoding="utf-8"?>
-<p:sld xmlns:a="http://schemas.openxmlformats.org/drawingml/2006/main" xmlns:r="http://schemas.openxmlformats.org/officeDocument/2006/relationships" xmlns:p="http://schemas.openxmlformats.org/presentationml/2006/main">
-  <p:cSld>
-    <p:spTree>
-      <p:nvGrpSpPr>
-        <p:cNvPr id="1" name=""/>
-        <p:cNvGrpSpPr/>
-        <p:nvPr/>
-      </p:nvGrpSpPr>
-      <p:grpSpPr>
-        <a:xfrm>
-          <a:off x="0" y="0"/>
-          <a:ext cx="0" cy="0"/>
-          <a:chOff x="0" y="0"/>
-          <a:chExt cx="0" cy="0"/>
-        </a:xfrm>
-      </p:grpSpPr>
-      <p:sp>
-        <p:nvSpPr>
-          <p:cNvPr id="2" name="Title 1"/>
-          <p:cNvSpPr>
-            <a:spLocks noGrp="1"/>
-          </p:cNvSpPr>
-          <p:nvPr>
-            <p:ph type="title"/>
-          </p:nvPr>
-        </p:nvSpPr>
-        <p:spPr/>
-        <p:txBody>
-          <a:bodyPr>
-            <a:normAutofit/>
-          </a:bodyPr>
-          <a:lstStyle/>
-          <a:p>
-            <a:r>
-              <a:rPr lang="en-US" sz="3200" b="1" dirty="0" smtClean="0">
-                <a:latin typeface="Times New Roman" charset="0"/>
-                <a:ea typeface="Times New Roman" charset="0"/>
-                <a:cs typeface="Times New Roman" charset="0"/>
-              </a:rPr>
-              <a:t>Problems Faced</a:t>
-            </a:r>
-            <a:endParaRPr lang="en-US" sz="3200" b="1" dirty="0">
-              <a:latin typeface="Times New Roman" charset="0"/>
-              <a:ea typeface="Times New Roman" charset="0"/>
-              <a:cs typeface="Times New Roman" charset="0"/>
-            </a:endParaRPr>
-          </a:p>
-        </p:txBody>
-      </p:sp>
-      <p:sp>
-        <p:nvSpPr>
-          <p:cNvPr id="3" name="Content Placeholder 2"/>
-          <p:cNvSpPr>
-            <a:spLocks noGrp="1"/>
-          </p:cNvSpPr>
-          <p:nvPr>
-            <p:ph idx="1"/>
-          </p:nvPr>
-        </p:nvSpPr>
-        <p:spPr/>
-        <p:txBody>
-          <a:bodyPr>
-            <a:normAutofit/>
-          </a:bodyPr>
-          <a:lstStyle/>
-          <a:p>
-            <a:r>
-              <a:rPr lang="en-US" sz="2000" dirty="0" smtClean="0">
-                <a:latin typeface="Times New Roman" charset="0"/>
-                <a:ea typeface="Times New Roman" charset="0"/>
-                <a:cs typeface="Times New Roman" charset="0"/>
-              </a:rPr>
-              <a:t>Handling the missing values</a:t>
-            </a:r>
-          </a:p>
-          <a:p>
-            <a:r>
-              <a:rPr lang="en-US" sz="2000" dirty="0" smtClean="0">
-                <a:latin typeface="Times New Roman" charset="0"/>
-                <a:ea typeface="Times New Roman" charset="0"/>
-                <a:cs typeface="Times New Roman" charset="0"/>
-              </a:rPr>
-              <a:t>Handling the large data affected the processing speed</a:t>
-            </a:r>
-          </a:p>
-          <a:p>
-            <a:r>
-              <a:rPr lang="en-US" sz="2000" dirty="0" smtClean="0">
-                <a:latin typeface="Times New Roman" charset="0"/>
-                <a:ea typeface="Times New Roman" charset="0"/>
-                <a:cs typeface="Times New Roman" charset="0"/>
-              </a:rPr>
-              <a:t>Fine tuning the models</a:t>
-            </a:r>
-            <a:endParaRPr lang="en-US" sz="2000" dirty="0">
-              <a:latin typeface="Times New Roman" charset="0"/>
-              <a:ea typeface="Times New Roman" charset="0"/>
-              <a:cs typeface="Times New Roman" charset="0"/>
-            </a:endParaRPr>
-          </a:p>
-        </p:txBody>
-      </p:sp>
-    </p:spTree>
-    <p:extLst>
-      <p:ext uri="{BB962C8B-B14F-4D97-AF65-F5344CB8AC3E}">
-        <p14:creationId xmlns:p14="http://schemas.microsoft.com/office/powerpoint/2010/main" val="1251662886"/>
       </p:ext>
     </p:extLst>
   </p:cSld>
@@ -9572,99 +9661,68 @@
           <a:lstStyle/>
           <a:p>
             <a:r>
-              <a:rPr lang="en-US" sz="3200" b="1" dirty="0" smtClean="0">
+              <a:rPr lang="en-US" sz="3200" b="1" dirty="0">
                 <a:latin typeface="Times New Roman" charset="0"/>
                 <a:ea typeface="Times New Roman" charset="0"/>
                 <a:cs typeface="Times New Roman" charset="0"/>
               </a:rPr>
-              <a:t>Way Forward</a:t>
-            </a:r>
-            <a:r>
-              <a:rPr lang="mr-IN" sz="3200" b="1" dirty="0" smtClean="0">
+              <a:t>Problems Faced</a:t>
+            </a:r>
+          </a:p>
+        </p:txBody>
+      </p:sp>
+      <p:sp>
+        <p:nvSpPr>
+          <p:cNvPr id="3" name="Content Placeholder 2"/>
+          <p:cNvSpPr>
+            <a:spLocks noGrp="1"/>
+          </p:cNvSpPr>
+          <p:nvPr>
+            <p:ph idx="1"/>
+          </p:nvPr>
+        </p:nvSpPr>
+        <p:spPr/>
+        <p:txBody>
+          <a:bodyPr>
+            <a:normAutofit/>
+          </a:bodyPr>
+          <a:lstStyle/>
+          <a:p>
+            <a:r>
+              <a:rPr lang="en-US" sz="2000" dirty="0">
                 <a:latin typeface="Times New Roman" charset="0"/>
                 <a:ea typeface="Times New Roman" charset="0"/>
                 <a:cs typeface="Times New Roman" charset="0"/>
               </a:rPr>
-              <a:t>…</a:t>
-            </a:r>
-            <a:endParaRPr lang="en-US" sz="3200" b="1" dirty="0">
-              <a:latin typeface="Times New Roman" charset="0"/>
-              <a:ea typeface="Times New Roman" charset="0"/>
-              <a:cs typeface="Times New Roman" charset="0"/>
-            </a:endParaRPr>
-          </a:p>
-        </p:txBody>
-      </p:sp>
-      <p:sp>
-        <p:nvSpPr>
-          <p:cNvPr id="3" name="Content Placeholder 2"/>
-          <p:cNvSpPr>
-            <a:spLocks noGrp="1"/>
-          </p:cNvSpPr>
-          <p:nvPr>
-            <p:ph idx="1"/>
-          </p:nvPr>
-        </p:nvSpPr>
-        <p:spPr/>
-        <p:txBody>
-          <a:bodyPr>
-            <a:normAutofit/>
-          </a:bodyPr>
-          <a:lstStyle/>
-          <a:p>
-            <a:r>
-              <a:rPr lang="en-US" sz="2000" dirty="0" smtClean="0">
+              <a:t>Handling the missing values</a:t>
+            </a:r>
+          </a:p>
+          <a:p>
+            <a:r>
+              <a:rPr lang="en-US" sz="2000" dirty="0">
                 <a:latin typeface="Times New Roman" charset="0"/>
                 <a:ea typeface="Times New Roman" charset="0"/>
                 <a:cs typeface="Times New Roman" charset="0"/>
               </a:rPr>
-              <a:t>Combine the models to improve the accuracy</a:t>
-            </a:r>
-          </a:p>
-          <a:p>
-            <a:r>
-              <a:rPr lang="en-US" sz="2000" dirty="0" smtClean="0">
+              <a:t>Handling the large data affected the processing speed</a:t>
+            </a:r>
+          </a:p>
+          <a:p>
+            <a:r>
+              <a:rPr lang="en-US" sz="2000" dirty="0">
                 <a:latin typeface="Times New Roman" charset="0"/>
                 <a:ea typeface="Times New Roman" charset="0"/>
                 <a:cs typeface="Times New Roman" charset="0"/>
               </a:rPr>
-              <a:t>Exploring the other methodologies like SVM, </a:t>
-            </a:r>
-            <a:r>
-              <a:rPr lang="en-US" sz="2000" dirty="0" err="1" smtClean="0">
-                <a:latin typeface="Times New Roman" charset="0"/>
-                <a:ea typeface="Times New Roman" charset="0"/>
-                <a:cs typeface="Times New Roman" charset="0"/>
-              </a:rPr>
-              <a:t>XGBoost</a:t>
-            </a:r>
-            <a:endParaRPr lang="en-US" sz="2000" dirty="0" smtClean="0">
-              <a:latin typeface="Times New Roman" charset="0"/>
-              <a:ea typeface="Times New Roman" charset="0"/>
-              <a:cs typeface="Times New Roman" charset="0"/>
-            </a:endParaRPr>
-          </a:p>
-          <a:p>
-            <a:r>
-              <a:rPr lang="en-US" sz="2000" dirty="0" smtClean="0">
-                <a:latin typeface="Times New Roman" charset="0"/>
-                <a:ea typeface="Times New Roman" charset="0"/>
-                <a:cs typeface="Times New Roman" charset="0"/>
-              </a:rPr>
-              <a:t>Embed samples in 2Dspace using PCA</a:t>
-            </a:r>
-            <a:endParaRPr lang="en-US" sz="2000" dirty="0">
-              <a:latin typeface="Times New Roman" charset="0"/>
-              <a:ea typeface="Times New Roman" charset="0"/>
-              <a:cs typeface="Times New Roman" charset="0"/>
-            </a:endParaRPr>
+              <a:t>Fine tuning the models</a:t>
+            </a:r>
           </a:p>
         </p:txBody>
       </p:sp>
     </p:spTree>
     <p:extLst>
       <p:ext uri="{BB962C8B-B14F-4D97-AF65-F5344CB8AC3E}">
-        <p14:creationId xmlns:p14="http://schemas.microsoft.com/office/powerpoint/2010/main" val="1542971618"/>
+        <p14:creationId xmlns:p14="http://schemas.microsoft.com/office/powerpoint/2010/main" val="1251662886"/>
       </p:ext>
     </p:extLst>
   </p:cSld>
@@ -9709,18 +9767,13 @@
           <a:lstStyle/>
           <a:p>
             <a:r>
-              <a:rPr lang="en-US" sz="3200" b="1" dirty="0" smtClean="0">
+              <a:rPr lang="en-US" sz="3200" b="1" dirty="0">
                 <a:latin typeface="Times New Roman" charset="0"/>
                 <a:ea typeface="Times New Roman" charset="0"/>
                 <a:cs typeface="Times New Roman" charset="0"/>
               </a:rPr>
               <a:t>The Data Sharks</a:t>
             </a:r>
-            <a:endParaRPr lang="en-US" sz="3200" b="1" dirty="0">
-              <a:latin typeface="Times New Roman" charset="0"/>
-              <a:ea typeface="Times New Roman" charset="0"/>
-              <a:cs typeface="Times New Roman" charset="0"/>
-            </a:endParaRPr>
           </a:p>
         </p:txBody>
       </p:sp>
@@ -9859,18 +9912,13 @@
           <a:p>
             <a:pPr algn="ctr"/>
             <a:r>
-              <a:rPr lang="en-US" sz="2000" dirty="0" smtClean="0">
+              <a:rPr lang="en-US" sz="2000" dirty="0">
                 <a:latin typeface="Times New Roman" charset="0"/>
                 <a:ea typeface="Times New Roman" charset="0"/>
                 <a:cs typeface="Times New Roman" charset="0"/>
               </a:rPr>
               <a:t>Brendan Reis</a:t>
             </a:r>
-            <a:endParaRPr lang="en-US" sz="2000" dirty="0">
-              <a:latin typeface="Times New Roman" charset="0"/>
-              <a:ea typeface="Times New Roman" charset="0"/>
-              <a:cs typeface="Times New Roman" charset="0"/>
-            </a:endParaRPr>
           </a:p>
         </p:txBody>
       </p:sp>
@@ -9898,18 +9946,13 @@
           <a:p>
             <a:pPr algn="ctr"/>
             <a:r>
-              <a:rPr lang="en-US" sz="2000" dirty="0" smtClean="0">
+              <a:rPr lang="en-US" sz="2000" dirty="0">
                 <a:latin typeface="Times New Roman" charset="0"/>
                 <a:ea typeface="Times New Roman" charset="0"/>
                 <a:cs typeface="Times New Roman" charset="0"/>
               </a:rPr>
               <a:t>Mounika Bandam</a:t>
             </a:r>
-            <a:endParaRPr lang="en-US" sz="2000" dirty="0">
-              <a:latin typeface="Times New Roman" charset="0"/>
-              <a:ea typeface="Times New Roman" charset="0"/>
-              <a:cs typeface="Times New Roman" charset="0"/>
-            </a:endParaRPr>
           </a:p>
         </p:txBody>
       </p:sp>
@@ -9937,7 +9980,7 @@
           <a:p>
             <a:pPr algn="ctr"/>
             <a:r>
-              <a:rPr lang="en-US" sz="2000" dirty="0" smtClean="0">
+              <a:rPr lang="en-US" sz="2000" dirty="0">
                 <a:latin typeface="Times New Roman" charset="0"/>
                 <a:ea typeface="Times New Roman" charset="0"/>
                 <a:cs typeface="Times New Roman" charset="0"/>
@@ -9945,7 +9988,7 @@
               <a:t>Karel </a:t>
             </a:r>
             <a:r>
-              <a:rPr lang="en-US" sz="2000" dirty="0" err="1" smtClean="0">
+              <a:rPr lang="en-US" sz="2000" dirty="0" err="1">
                 <a:latin typeface="Times New Roman" charset="0"/>
                 <a:ea typeface="Times New Roman" charset="0"/>
                 <a:cs typeface="Times New Roman" charset="0"/>
@@ -10008,12 +10051,20 @@
           <a:lstStyle/>
           <a:p>
             <a:r>
-              <a:rPr lang="en-US" sz="3200" b="1" dirty="0" smtClean="0">
+              <a:rPr lang="en-US" sz="3200" b="1" dirty="0">
                 <a:latin typeface="Times New Roman" charset="0"/>
                 <a:ea typeface="Times New Roman" charset="0"/>
                 <a:cs typeface="Times New Roman" charset="0"/>
               </a:rPr>
-              <a:t>Conclusion</a:t>
+              <a:t>Way Forward</a:t>
+            </a:r>
+            <a:r>
+              <a:rPr lang="mr-IN" sz="3200" b="1" dirty="0">
+                <a:latin typeface="Times New Roman" charset="0"/>
+                <a:ea typeface="Times New Roman" charset="0"/>
+                <a:cs typeface="Times New Roman" charset="0"/>
+              </a:rPr>
+              <a:t>…</a:t>
             </a:r>
             <a:endParaRPr lang="en-US" sz="3200" b="1" dirty="0">
               <a:latin typeface="Times New Roman" charset="0"/>
@@ -10040,41 +10091,31 @@
           </a:bodyPr>
           <a:lstStyle/>
           <a:p>
-            <a:pPr>
-              <a:buFont typeface="Arial" panose="020B0604020202020204" pitchFamily="34" charset="0"/>
-              <a:buChar char="•"/>
-            </a:pPr>
             <a:r>
               <a:rPr lang="en-US" sz="2000" dirty="0">
                 <a:latin typeface="Times New Roman" charset="0"/>
                 <a:ea typeface="Times New Roman" charset="0"/>
                 <a:cs typeface="Times New Roman" charset="0"/>
               </a:rPr>
-              <a:t>We trained the data </a:t>
-            </a:r>
-            <a:r>
-              <a:rPr lang="en-US" sz="2000" dirty="0" smtClean="0">
-                <a:latin typeface="Times New Roman" charset="0"/>
-                <a:ea typeface="Times New Roman" charset="0"/>
-                <a:cs typeface="Times New Roman" charset="0"/>
-              </a:rPr>
-              <a:t>on various methodologies like </a:t>
-            </a:r>
+              <a:t>Combine the models to improve the accuracy</a:t>
+            </a:r>
+          </a:p>
+          <a:p>
             <a:r>
               <a:rPr lang="en-US" sz="2000" dirty="0">
                 <a:latin typeface="Times New Roman" charset="0"/>
                 <a:ea typeface="Times New Roman" charset="0"/>
                 <a:cs typeface="Times New Roman" charset="0"/>
               </a:rPr>
-              <a:t>Random Forest, Logistic Regression and K-Nearest Neighbor </a:t>
-            </a:r>
-            <a:r>
-              <a:rPr lang="en-US" sz="2000" dirty="0" smtClean="0">
+              <a:t>Exploring the other methodologies like SVM, </a:t>
+            </a:r>
+            <a:r>
+              <a:rPr lang="en-US" sz="2000" dirty="0" err="1">
                 <a:latin typeface="Times New Roman" charset="0"/>
                 <a:ea typeface="Times New Roman" charset="0"/>
                 <a:cs typeface="Times New Roman" charset="0"/>
               </a:rPr>
-              <a:t>classifiers, CART</a:t>
+              <a:t>XGBoost</a:t>
             </a:r>
             <a:endParaRPr lang="en-US" sz="2000" dirty="0">
               <a:latin typeface="Times New Roman" charset="0"/>
@@ -10083,44 +10124,13 @@
             </a:endParaRPr>
           </a:p>
           <a:p>
-            <a:pPr>
-              <a:buFont typeface="Arial" panose="020B0604020202020204" pitchFamily="34" charset="0"/>
-              <a:buChar char="•"/>
-            </a:pPr>
             <a:r>
               <a:rPr lang="en-US" sz="2000" dirty="0">
                 <a:latin typeface="Times New Roman" charset="0"/>
                 <a:ea typeface="Times New Roman" charset="0"/>
                 <a:cs typeface="Times New Roman" charset="0"/>
               </a:rPr>
-              <a:t> Random Forest clocked the maximum prediction accuracy of </a:t>
-            </a:r>
-            <a:r>
-              <a:rPr lang="en-US" sz="2000" dirty="0" smtClean="0">
-                <a:latin typeface="Times New Roman" charset="0"/>
-                <a:ea typeface="Times New Roman" charset="0"/>
-                <a:cs typeface="Times New Roman" charset="0"/>
-              </a:rPr>
-              <a:t>54%</a:t>
-            </a:r>
-            <a:endParaRPr lang="en-US" sz="2000" dirty="0">
-              <a:latin typeface="Times New Roman" charset="0"/>
-              <a:ea typeface="Times New Roman" charset="0"/>
-              <a:cs typeface="Times New Roman" charset="0"/>
-            </a:endParaRPr>
-          </a:p>
-          <a:p>
-            <a:pPr>
-              <a:buFont typeface="Arial" panose="020B0604020202020204" pitchFamily="34" charset="0"/>
-              <a:buChar char="•"/>
-            </a:pPr>
-            <a:r>
-              <a:rPr lang="en-US" sz="2000" dirty="0">
-                <a:latin typeface="Times New Roman" charset="0"/>
-                <a:ea typeface="Times New Roman" charset="0"/>
-                <a:cs typeface="Times New Roman" charset="0"/>
-              </a:rPr>
-              <a:t> Streamline the process of life insurance risk classification</a:t>
+              <a:t>Embed samples in 2Dspace using PCA</a:t>
             </a:r>
           </a:p>
         </p:txBody>
@@ -10128,7 +10138,7 @@
     </p:spTree>
     <p:extLst>
       <p:ext uri="{BB962C8B-B14F-4D97-AF65-F5344CB8AC3E}">
-        <p14:creationId xmlns:p14="http://schemas.microsoft.com/office/powerpoint/2010/main" val="1858946201"/>
+        <p14:creationId xmlns:p14="http://schemas.microsoft.com/office/powerpoint/2010/main" val="1542971618"/>
       </p:ext>
     </p:extLst>
   </p:cSld>
@@ -10157,6 +10167,124 @@
       </p:grpSpPr>
       <p:sp>
         <p:nvSpPr>
+          <p:cNvPr id="2" name="Title 1"/>
+          <p:cNvSpPr>
+            <a:spLocks noGrp="1"/>
+          </p:cNvSpPr>
+          <p:nvPr>
+            <p:ph type="title"/>
+          </p:nvPr>
+        </p:nvSpPr>
+        <p:spPr/>
+        <p:txBody>
+          <a:bodyPr>
+            <a:normAutofit/>
+          </a:bodyPr>
+          <a:lstStyle/>
+          <a:p>
+            <a:r>
+              <a:rPr lang="en-US" sz="3200" b="1" dirty="0">
+                <a:latin typeface="Times New Roman" charset="0"/>
+                <a:ea typeface="Times New Roman" charset="0"/>
+                <a:cs typeface="Times New Roman" charset="0"/>
+              </a:rPr>
+              <a:t>Conclusion</a:t>
+            </a:r>
+          </a:p>
+        </p:txBody>
+      </p:sp>
+      <p:sp>
+        <p:nvSpPr>
+          <p:cNvPr id="3" name="Content Placeholder 2"/>
+          <p:cNvSpPr>
+            <a:spLocks noGrp="1"/>
+          </p:cNvSpPr>
+          <p:nvPr>
+            <p:ph idx="1"/>
+          </p:nvPr>
+        </p:nvSpPr>
+        <p:spPr/>
+        <p:txBody>
+          <a:bodyPr>
+            <a:normAutofit/>
+          </a:bodyPr>
+          <a:lstStyle/>
+          <a:p>
+            <a:pPr>
+              <a:buFont typeface="Arial" panose="020B0604020202020204" pitchFamily="34" charset="0"/>
+              <a:buChar char="•"/>
+            </a:pPr>
+            <a:r>
+              <a:rPr lang="en-US" sz="2000" dirty="0">
+                <a:latin typeface="Times New Roman" charset="0"/>
+                <a:ea typeface="Times New Roman" charset="0"/>
+                <a:cs typeface="Times New Roman" charset="0"/>
+              </a:rPr>
+              <a:t>We trained the data on various methodologies like Random Forest, Logistic Regression and K-Nearest Neighbor classifiers, CART</a:t>
+            </a:r>
+          </a:p>
+          <a:p>
+            <a:pPr>
+              <a:buFont typeface="Arial" panose="020B0604020202020204" pitchFamily="34" charset="0"/>
+              <a:buChar char="•"/>
+            </a:pPr>
+            <a:r>
+              <a:rPr lang="en-US" sz="2000" dirty="0">
+                <a:latin typeface="Times New Roman" charset="0"/>
+                <a:ea typeface="Times New Roman" charset="0"/>
+                <a:cs typeface="Times New Roman" charset="0"/>
+              </a:rPr>
+              <a:t> Random Forest clocked the maximum prediction accuracy of 54%</a:t>
+            </a:r>
+          </a:p>
+          <a:p>
+            <a:pPr>
+              <a:buFont typeface="Arial" panose="020B0604020202020204" pitchFamily="34" charset="0"/>
+              <a:buChar char="•"/>
+            </a:pPr>
+            <a:r>
+              <a:rPr lang="en-US" sz="2000" dirty="0">
+                <a:latin typeface="Times New Roman" charset="0"/>
+                <a:ea typeface="Times New Roman" charset="0"/>
+                <a:cs typeface="Times New Roman" charset="0"/>
+              </a:rPr>
+              <a:t> Streamline the process of life insurance risk classification</a:t>
+            </a:r>
+          </a:p>
+        </p:txBody>
+      </p:sp>
+    </p:spTree>
+    <p:extLst>
+      <p:ext uri="{BB962C8B-B14F-4D97-AF65-F5344CB8AC3E}">
+        <p14:creationId xmlns:p14="http://schemas.microsoft.com/office/powerpoint/2010/main" val="1858946201"/>
+      </p:ext>
+    </p:extLst>
+  </p:cSld>
+  <p:clrMapOvr>
+    <a:masterClrMapping/>
+  </p:clrMapOvr>
+</p:sld>
+</file>
+
+<file path=ppt/slides/slide22.xml><?xml version="1.0" encoding="utf-8"?>
+<p:sld xmlns:a="http://schemas.openxmlformats.org/drawingml/2006/main" xmlns:r="http://schemas.openxmlformats.org/officeDocument/2006/relationships" xmlns:p="http://schemas.openxmlformats.org/presentationml/2006/main">
+  <p:cSld>
+    <p:spTree>
+      <p:nvGrpSpPr>
+        <p:cNvPr id="1" name=""/>
+        <p:cNvGrpSpPr/>
+        <p:nvPr/>
+      </p:nvGrpSpPr>
+      <p:grpSpPr>
+        <a:xfrm>
+          <a:off x="0" y="0"/>
+          <a:ext cx="0" cy="0"/>
+          <a:chOff x="0" y="0"/>
+          <a:chExt cx="0" cy="0"/>
+        </a:xfrm>
+      </p:grpSpPr>
+      <p:sp>
+        <p:nvSpPr>
           <p:cNvPr id="2" name="TextBox 1"/>
           <p:cNvSpPr txBox="1"/>
           <p:nvPr/>
@@ -10179,18 +10307,13 @@
           <a:p>
             <a:pPr algn="ctr"/>
             <a:r>
-              <a:rPr lang="en-US" sz="4000" b="1" dirty="0" smtClean="0">
+              <a:rPr lang="en-US" sz="4000" b="1" dirty="0">
                 <a:latin typeface="Times New Roman" charset="0"/>
                 <a:ea typeface="Times New Roman" charset="0"/>
                 <a:cs typeface="Times New Roman" charset="0"/>
               </a:rPr>
               <a:t>Thank you</a:t>
             </a:r>
-            <a:endParaRPr lang="en-US" sz="4000" b="1" dirty="0">
-              <a:latin typeface="Times New Roman" charset="0"/>
-              <a:ea typeface="Times New Roman" charset="0"/>
-              <a:cs typeface="Times New Roman" charset="0"/>
-            </a:endParaRPr>
           </a:p>
         </p:txBody>
       </p:sp>
@@ -10242,7 +10365,7 @@
           <a:lstStyle/>
           <a:p>
             <a:r>
-              <a:rPr lang="en-US" sz="3200" b="1" dirty="0" smtClean="0">
+              <a:rPr lang="en-US" sz="3200" b="1" dirty="0">
                 <a:latin typeface="Times New Roman" charset="0"/>
                 <a:ea typeface="Times New Roman" charset="0"/>
                 <a:cs typeface="Times New Roman" charset="0"/>
@@ -10250,25 +10373,20 @@
               <a:t>The Challenge</a:t>
             </a:r>
             <a:br>
-              <a:rPr lang="en-US" sz="3200" b="1" dirty="0" smtClean="0">
+              <a:rPr lang="en-US" sz="3200" b="1" dirty="0">
                 <a:latin typeface="Times New Roman" charset="0"/>
                 <a:ea typeface="Times New Roman" charset="0"/>
                 <a:cs typeface="Times New Roman" charset="0"/>
               </a:rPr>
             </a:br>
             <a:r>
-              <a:rPr lang="en-US" sz="3200" b="1" dirty="0" smtClean="0">
+              <a:rPr lang="en-US" sz="3200" b="1" dirty="0">
                 <a:latin typeface="Times New Roman" charset="0"/>
                 <a:ea typeface="Times New Roman" charset="0"/>
                 <a:cs typeface="Times New Roman" charset="0"/>
               </a:rPr>
               <a:t>Prudential Life Insurance Assessment</a:t>
             </a:r>
-            <a:endParaRPr lang="en-US" sz="3200" b="1" dirty="0">
-              <a:latin typeface="Times New Roman" charset="0"/>
-              <a:ea typeface="Times New Roman" charset="0"/>
-              <a:cs typeface="Times New Roman" charset="0"/>
-            </a:endParaRPr>
           </a:p>
         </p:txBody>
       </p:sp>
@@ -10338,32 +10456,10 @@
                 <a:ea typeface="Times New Roman" charset="0"/>
                 <a:cs typeface="Times New Roman" charset="0"/>
               </a:rPr>
-              <a:t>Life </a:t>
-            </a:r>
-            <a:r>
-              <a:rPr lang="en-US" dirty="0" smtClean="0">
-                <a:solidFill>
-                  <a:schemeClr val="tx1"/>
-                </a:solidFill>
-                <a:latin typeface="Times New Roman" charset="0"/>
-                <a:ea typeface="Times New Roman" charset="0"/>
-                <a:cs typeface="Times New Roman" charset="0"/>
-              </a:rPr>
-              <a:t>Insurance, Mutual Funds, Retirement, Annuity, Real Estate</a:t>
-            </a:r>
-          </a:p>
-          <a:p>
-            <a:r>
-              <a:rPr lang="en-US" sz="2000" dirty="0" smtClean="0">
-                <a:solidFill>
-                  <a:schemeClr val="tx1"/>
-                </a:solidFill>
-                <a:latin typeface="Times New Roman" charset="0"/>
-                <a:ea typeface="Times New Roman" charset="0"/>
-                <a:cs typeface="Times New Roman" charset="0"/>
-              </a:rPr>
-              <a:t>Life </a:t>
-            </a:r>
+              <a:t>Life Insurance, Mutual Funds, Retirement, Annuity, Real Estate</a:t>
+            </a:r>
+          </a:p>
+          <a:p>
             <a:r>
               <a:rPr lang="en-US" sz="2000" dirty="0">
                 <a:solidFill>
@@ -10373,23 +10469,12 @@
                 <a:ea typeface="Times New Roman" charset="0"/>
                 <a:cs typeface="Times New Roman" charset="0"/>
               </a:rPr>
-              <a:t>insurance application process is </a:t>
-            </a:r>
-            <a:r>
-              <a:rPr lang="en-US" sz="2000" dirty="0" smtClean="0">
-                <a:solidFill>
-                  <a:schemeClr val="tx1"/>
-                </a:solidFill>
-                <a:latin typeface="Times New Roman" charset="0"/>
-                <a:ea typeface="Times New Roman" charset="0"/>
-                <a:cs typeface="Times New Roman" charset="0"/>
-              </a:rPr>
-              <a:t>antiquated</a:t>
-            </a:r>
-          </a:p>
-          <a:p>
-            <a:r>
-              <a:rPr lang="en-US" sz="2000" dirty="0" smtClean="0">
+              <a:t>Life insurance application process is antiquated</a:t>
+            </a:r>
+          </a:p>
+          <a:p>
+            <a:r>
+              <a:rPr lang="en-US" sz="2000" dirty="0">
                 <a:solidFill>
                   <a:schemeClr val="tx1"/>
                 </a:solidFill>
@@ -10402,7 +10487,7 @@
           </a:p>
           <a:p>
             <a:r>
-              <a:rPr lang="en-US" sz="2000" dirty="0" smtClean="0">
+              <a:rPr lang="en-US" sz="2000" dirty="0">
                 <a:solidFill>
                   <a:schemeClr val="tx1"/>
                 </a:solidFill>
@@ -10419,17 +10504,6 @@
               <a:buChar char="•"/>
             </a:pPr>
             <a:r>
-              <a:rPr lang="en-US" sz="2000" dirty="0" smtClean="0">
-                <a:solidFill>
-                  <a:schemeClr val="tx1"/>
-                </a:solidFill>
-                <a:latin typeface="Times New Roman" charset="0"/>
-                <a:ea typeface="Times New Roman" charset="0"/>
-                <a:cs typeface="Times New Roman" charset="0"/>
-              </a:rPr>
-              <a:t>Build </a:t>
-            </a:r>
-            <a:r>
               <a:rPr lang="en-US" sz="2000" dirty="0">
                 <a:solidFill>
                   <a:schemeClr val="tx1"/>
@@ -10438,7 +10512,7 @@
                 <a:ea typeface="Times New Roman" charset="0"/>
                 <a:cs typeface="Times New Roman" charset="0"/>
               </a:rPr>
-              <a:t>an predictive model that classifies the risk using an automated approach</a:t>
+              <a:t>Build an predictive model that classifies the risk using an automated approach</a:t>
             </a:r>
           </a:p>
         </p:txBody>
@@ -10491,18 +10565,13 @@
           <a:lstStyle/>
           <a:p>
             <a:r>
-              <a:rPr lang="en-US" sz="3200" b="1" dirty="0" smtClean="0">
+              <a:rPr lang="en-US" sz="3200" b="1" dirty="0">
                 <a:latin typeface="Times New Roman" charset="0"/>
                 <a:ea typeface="Times New Roman" charset="0"/>
                 <a:cs typeface="Times New Roman" charset="0"/>
               </a:rPr>
               <a:t>Dataset</a:t>
             </a:r>
-            <a:endParaRPr lang="en-US" sz="3200" b="1" dirty="0">
-              <a:latin typeface="Times New Roman" charset="0"/>
-              <a:ea typeface="Times New Roman" charset="0"/>
-              <a:cs typeface="Times New Roman" charset="0"/>
-            </a:endParaRPr>
           </a:p>
         </p:txBody>
       </p:sp>
@@ -10563,7 +10632,7 @@
           </a:p>
           <a:p>
             <a:r>
-              <a:rPr lang="en-US" sz="1600" dirty="0" smtClean="0">
+              <a:rPr lang="en-US" sz="1600" dirty="0">
                 <a:latin typeface="Times New Roman" charset="0"/>
                 <a:ea typeface="Times New Roman" charset="0"/>
                 <a:cs typeface="Times New Roman" charset="0"/>
@@ -10573,7 +10642,7 @@
           </a:p>
           <a:p>
             <a:r>
-              <a:rPr lang="en-US" sz="1600" dirty="0" smtClean="0">
+              <a:rPr lang="en-US" sz="1600" dirty="0">
                 <a:latin typeface="Times New Roman" charset="0"/>
                 <a:ea typeface="Times New Roman" charset="0"/>
                 <a:cs typeface="Times New Roman" charset="0"/>
@@ -10584,7 +10653,7 @@
           <a:p>
             <a:pPr lvl="1"/>
             <a:r>
-              <a:rPr lang="en-US" sz="1600" dirty="0" smtClean="0">
+              <a:rPr lang="en-US" sz="1600" dirty="0">
                 <a:latin typeface="Times New Roman" charset="0"/>
                 <a:ea typeface="Times New Roman" charset="0"/>
                 <a:cs typeface="Times New Roman" charset="0"/>
@@ -10595,7 +10664,7 @@
           <a:p>
             <a:pPr lvl="1"/>
             <a:r>
-              <a:rPr lang="en-US" sz="1600" dirty="0" smtClean="0">
+              <a:rPr lang="en-US" sz="1600" dirty="0">
                 <a:latin typeface="Times New Roman" charset="0"/>
                 <a:ea typeface="Times New Roman" charset="0"/>
                 <a:cs typeface="Times New Roman" charset="0"/>
@@ -10606,7 +10675,7 @@
           <a:p>
             <a:pPr lvl="1"/>
             <a:r>
-              <a:rPr lang="en-US" sz="1600" dirty="0" smtClean="0">
+              <a:rPr lang="en-US" sz="1600" dirty="0">
                 <a:latin typeface="Times New Roman" charset="0"/>
                 <a:ea typeface="Times New Roman" charset="0"/>
                 <a:cs typeface="Times New Roman" charset="0"/>
@@ -10616,33 +10685,17 @@
           </a:p>
           <a:p>
             <a:r>
-              <a:rPr lang="en-US" sz="1600" dirty="0" smtClean="0">
-                <a:latin typeface="Times New Roman" charset="0"/>
-                <a:ea typeface="Times New Roman" charset="0"/>
-                <a:cs typeface="Times New Roman" charset="0"/>
-              </a:rPr>
-              <a:t>Target Variable – </a:t>
-            </a:r>
-            <a:r>
               <a:rPr lang="en-US" sz="1600" dirty="0">
                 <a:latin typeface="Times New Roman" charset="0"/>
                 <a:ea typeface="Times New Roman" charset="0"/>
                 <a:cs typeface="Times New Roman" charset="0"/>
               </a:rPr>
-              <a:t>"Response" is an ordinal measure of risk that has 8 levels</a:t>
-            </a:r>
-            <a:r>
-              <a:rPr lang="en-US" sz="1600" dirty="0" smtClean="0">
-                <a:latin typeface="Times New Roman" charset="0"/>
-                <a:ea typeface="Times New Roman" charset="0"/>
-                <a:cs typeface="Times New Roman" charset="0"/>
-              </a:rPr>
-              <a:t>.</a:t>
-            </a:r>
-          </a:p>
-          <a:p>
-            <a:r>
-              <a:rPr lang="en-US" sz="1600" dirty="0" smtClean="0">
+              <a:t>Target Variable – "Response" is an ordinal measure of risk that has 8 levels.</a:t>
+            </a:r>
+          </a:p>
+          <a:p>
+            <a:r>
+              <a:rPr lang="en-US" sz="1600" dirty="0">
                 <a:latin typeface="Times New Roman" charset="0"/>
                 <a:ea typeface="Times New Roman" charset="0"/>
                 <a:cs typeface="Times New Roman" charset="0"/>
@@ -10653,45 +10706,24 @@
           <a:p>
             <a:pPr lvl="1"/>
             <a:r>
-              <a:rPr lang="en-US" sz="1600" dirty="0" smtClean="0">
-                <a:latin typeface="Times New Roman" charset="0"/>
-                <a:ea typeface="Times New Roman" charset="0"/>
-                <a:cs typeface="Times New Roman" charset="0"/>
-              </a:rPr>
-              <a:t>We </a:t>
-            </a:r>
-            <a:r>
               <a:rPr lang="en-US" sz="1600" dirty="0">
                 <a:latin typeface="Times New Roman" charset="0"/>
                 <a:ea typeface="Times New Roman" charset="0"/>
                 <a:cs typeface="Times New Roman" charset="0"/>
               </a:rPr>
-              <a:t>are “blind” to the actual </a:t>
-            </a:r>
-            <a:r>
-              <a:rPr lang="en-US" sz="1600" dirty="0" smtClean="0">
-                <a:latin typeface="Times New Roman" charset="0"/>
-                <a:ea typeface="Times New Roman" charset="0"/>
-                <a:cs typeface="Times New Roman" charset="0"/>
-              </a:rPr>
-              <a:t>content</a:t>
+              <a:t>We are “blind” to the actual content</a:t>
             </a:r>
           </a:p>
           <a:p>
             <a:pPr lvl="1"/>
             <a:r>
-              <a:rPr lang="en-US" sz="1600" dirty="0" smtClean="0">
+              <a:rPr lang="en-US" sz="1600" dirty="0">
                 <a:latin typeface="Times New Roman" charset="0"/>
                 <a:ea typeface="Times New Roman" charset="0"/>
                 <a:cs typeface="Times New Roman" charset="0"/>
               </a:rPr>
               <a:t>Domain Knowledge</a:t>
             </a:r>
-            <a:endParaRPr lang="en-US" sz="1600" dirty="0">
-              <a:latin typeface="Times New Roman" charset="0"/>
-              <a:ea typeface="Times New Roman" charset="0"/>
-              <a:cs typeface="Times New Roman" charset="0"/>
-            </a:endParaRPr>
           </a:p>
         </p:txBody>
       </p:sp>
@@ -10743,7 +10775,7 @@
           <a:lstStyle/>
           <a:p>
             <a:r>
-              <a:rPr lang="en-US" sz="3200" b="1" dirty="0" smtClean="0">
+              <a:rPr lang="en-US" sz="3200" b="1" dirty="0">
                 <a:latin typeface="Times New Roman" charset="0"/>
                 <a:ea typeface="Times New Roman" charset="0"/>
                 <a:cs typeface="Times New Roman" charset="0"/>
@@ -10832,18 +10864,13 @@
           <a:lstStyle/>
           <a:p>
             <a:r>
-              <a:rPr lang="en-US" sz="3200" b="1" dirty="0" smtClean="0">
+              <a:rPr lang="en-US" sz="3200" b="1" dirty="0">
                 <a:latin typeface="Times New Roman" charset="0"/>
                 <a:ea typeface="Times New Roman" charset="0"/>
                 <a:cs typeface="Times New Roman" charset="0"/>
               </a:rPr>
               <a:t>Analyzing the Dataset</a:t>
             </a:r>
-            <a:endParaRPr lang="en-US" sz="3200" b="1" dirty="0">
-              <a:latin typeface="Times New Roman" charset="0"/>
-              <a:ea typeface="Times New Roman" charset="0"/>
-              <a:cs typeface="Times New Roman" charset="0"/>
-            </a:endParaRPr>
           </a:p>
         </p:txBody>
       </p:sp>
@@ -10867,50 +10894,18 @@
             <a:pPr marL="0" indent="0">
               <a:buNone/>
             </a:pPr>
-            <a:r>
-              <a:rPr lang="en-US" sz="2000" b="1" dirty="0" smtClean="0">
-                <a:latin typeface="Times New Roman" charset="0"/>
-                <a:ea typeface="Times New Roman" charset="0"/>
-                <a:cs typeface="Times New Roman" charset="0"/>
-              </a:rPr>
-              <a:t>“The difference between </a:t>
-            </a:r>
             <a:r>
               <a:rPr lang="en-US" sz="2000" b="1" dirty="0">
                 <a:latin typeface="Times New Roman" charset="0"/>
                 <a:ea typeface="Times New Roman" charset="0"/>
                 <a:cs typeface="Times New Roman" charset="0"/>
               </a:rPr>
-              <a:t>an average data scientist </a:t>
-            </a:r>
-            <a:r>
-              <a:rPr lang="en-US" sz="2000" b="1" dirty="0" smtClean="0">
-                <a:latin typeface="Times New Roman" charset="0"/>
-                <a:ea typeface="Times New Roman" charset="0"/>
-                <a:cs typeface="Times New Roman" charset="0"/>
-              </a:rPr>
-              <a:t>and a </a:t>
-            </a:r>
-            <a:r>
-              <a:rPr lang="en-US" sz="2000" b="1" dirty="0">
-                <a:latin typeface="Times New Roman" charset="0"/>
-                <a:ea typeface="Times New Roman" charset="0"/>
-                <a:cs typeface="Times New Roman" charset="0"/>
-              </a:rPr>
-              <a:t>master data scientist</a:t>
-            </a:r>
-            <a:r>
-              <a:rPr lang="en-US" sz="2000" b="1" dirty="0" smtClean="0">
-                <a:latin typeface="Times New Roman" charset="0"/>
-                <a:ea typeface="Times New Roman" charset="0"/>
-                <a:cs typeface="Times New Roman" charset="0"/>
-              </a:rPr>
-              <a:t>…”</a:t>
-            </a:r>
-          </a:p>
-          <a:p>
-            <a:r>
-              <a:rPr lang="en-US" sz="2000" dirty="0" smtClean="0">
+              <a:t>“The difference between an average data scientist and a master data scientist…”</a:t>
+            </a:r>
+          </a:p>
+          <a:p>
+            <a:r>
+              <a:rPr lang="en-US" sz="2000" dirty="0">
                 <a:latin typeface="Times New Roman" charset="0"/>
                 <a:ea typeface="Times New Roman" charset="0"/>
                 <a:cs typeface="Times New Roman" charset="0"/>
@@ -10920,22 +10915,17 @@
           </a:p>
           <a:p>
             <a:r>
-              <a:rPr lang="en-US" sz="2000" dirty="0" smtClean="0">
+              <a:rPr lang="en-US" sz="2000" dirty="0">
                 <a:latin typeface="Times New Roman" charset="0"/>
                 <a:ea typeface="Times New Roman" charset="0"/>
                 <a:cs typeface="Times New Roman" charset="0"/>
               </a:rPr>
               <a:t>Approached variable selection method</a:t>
             </a:r>
-            <a:endParaRPr lang="en-US" sz="2000" dirty="0" smtClean="0">
-              <a:latin typeface="Times New Roman" charset="0"/>
-              <a:ea typeface="Times New Roman" charset="0"/>
-              <a:cs typeface="Times New Roman" charset="0"/>
-            </a:endParaRPr>
-          </a:p>
-          <a:p>
-            <a:r>
-              <a:rPr lang="en-US" sz="2000" dirty="0" smtClean="0">
+          </a:p>
+          <a:p>
+            <a:r>
+              <a:rPr lang="en-US" sz="2000" dirty="0">
                 <a:latin typeface="Times New Roman" charset="0"/>
                 <a:ea typeface="Times New Roman" charset="0"/>
                 <a:cs typeface="Times New Roman" charset="0"/>
@@ -10945,7 +10935,7 @@
           </a:p>
           <a:p>
             <a:r>
-              <a:rPr lang="en-US" sz="2000" dirty="0" smtClean="0">
+              <a:rPr lang="en-US" sz="2000" dirty="0">
                 <a:latin typeface="Times New Roman" charset="0"/>
                 <a:ea typeface="Times New Roman" charset="0"/>
                 <a:cs typeface="Times New Roman" charset="0"/>
@@ -10955,18 +10945,13 @@
           </a:p>
           <a:p>
             <a:r>
-              <a:rPr lang="en-US" sz="2000" dirty="0" smtClean="0">
+              <a:rPr lang="en-US" sz="2000" dirty="0">
                 <a:latin typeface="Times New Roman" charset="0"/>
                 <a:ea typeface="Times New Roman" charset="0"/>
                 <a:cs typeface="Times New Roman" charset="0"/>
               </a:rPr>
               <a:t>Remove columns that do not disperse “properly” (80/20 rule)</a:t>
             </a:r>
-            <a:endParaRPr lang="en-US" sz="2000" dirty="0">
-              <a:latin typeface="Times New Roman" charset="0"/>
-              <a:ea typeface="Times New Roman" charset="0"/>
-              <a:cs typeface="Times New Roman" charset="0"/>
-            </a:endParaRPr>
           </a:p>
         </p:txBody>
       </p:sp>
@@ -11018,18 +11003,13 @@
           <a:lstStyle/>
           <a:p>
             <a:r>
-              <a:rPr lang="en-US" sz="3200" b="1" dirty="0" smtClean="0">
+              <a:rPr lang="en-US" sz="3200" b="1" dirty="0">
                 <a:latin typeface="Times New Roman" charset="0"/>
                 <a:ea typeface="Times New Roman" charset="0"/>
                 <a:cs typeface="Times New Roman" charset="0"/>
               </a:rPr>
               <a:t>Response Breakdown</a:t>
             </a:r>
-            <a:endParaRPr lang="en-US" sz="3200" b="1" dirty="0">
-              <a:latin typeface="Times New Roman" charset="0"/>
-              <a:ea typeface="Times New Roman" charset="0"/>
-              <a:cs typeface="Times New Roman" charset="0"/>
-            </a:endParaRPr>
           </a:p>
         </p:txBody>
       </p:sp>
@@ -11105,18 +11085,13 @@
           <a:lstStyle/>
           <a:p>
             <a:r>
-              <a:rPr lang="en-US" sz="3200" b="1" dirty="0" smtClean="0">
+              <a:rPr lang="en-US" sz="3200" b="1" dirty="0">
                 <a:latin typeface="Times New Roman" charset="0"/>
                 <a:ea typeface="Times New Roman" charset="0"/>
                 <a:cs typeface="Times New Roman" charset="0"/>
               </a:rPr>
               <a:t>Algorithms Used</a:t>
             </a:r>
-            <a:endParaRPr lang="en-US" sz="3200" b="1" dirty="0">
-              <a:latin typeface="Times New Roman" charset="0"/>
-              <a:ea typeface="Times New Roman" charset="0"/>
-              <a:cs typeface="Times New Roman" charset="0"/>
-            </a:endParaRPr>
           </a:p>
         </p:txBody>
       </p:sp>
@@ -11142,8 +11117,16 @@
           </a:bodyPr>
           <a:lstStyle/>
           <a:p>
-            <a:r>
-              <a:rPr lang="en-US" sz="2000" dirty="0" smtClean="0">
+            <a:pPr>
+              <a:spcBef>
+                <a:spcPts val="300"/>
+              </a:spcBef>
+              <a:spcAft>
+                <a:spcPts val="300"/>
+              </a:spcAft>
+            </a:pPr>
+            <a:r>
+              <a:rPr lang="en-US" sz="2000" dirty="0">
                 <a:latin typeface="Times New Roman" charset="0"/>
                 <a:ea typeface="Times New Roman" charset="0"/>
                 <a:cs typeface="Times New Roman" charset="0"/>
@@ -11152,8 +11135,16 @@
             </a:r>
           </a:p>
           <a:p>
-            <a:r>
-              <a:rPr lang="en-US" sz="2000" dirty="0" smtClean="0">
+            <a:pPr>
+              <a:spcBef>
+                <a:spcPts val="300"/>
+              </a:spcBef>
+              <a:spcAft>
+                <a:spcPts val="300"/>
+              </a:spcAft>
+            </a:pPr>
+            <a:r>
+              <a:rPr lang="en-US" sz="2000" dirty="0">
                 <a:latin typeface="Times New Roman" charset="0"/>
                 <a:ea typeface="Times New Roman" charset="0"/>
                 <a:cs typeface="Times New Roman" charset="0"/>
@@ -11162,8 +11153,16 @@
             </a:r>
           </a:p>
           <a:p>
-            <a:r>
-              <a:rPr lang="en-US" sz="2000" dirty="0" smtClean="0">
+            <a:pPr>
+              <a:spcBef>
+                <a:spcPts val="300"/>
+              </a:spcBef>
+              <a:spcAft>
+                <a:spcPts val="300"/>
+              </a:spcAft>
+            </a:pPr>
+            <a:r>
+              <a:rPr lang="en-US" sz="2000" dirty="0">
                 <a:latin typeface="Times New Roman" charset="0"/>
                 <a:ea typeface="Times New Roman" charset="0"/>
                 <a:cs typeface="Times New Roman" charset="0"/>
@@ -11172,8 +11171,16 @@
             </a:r>
           </a:p>
           <a:p>
-            <a:r>
-              <a:rPr lang="en-US" sz="2000" dirty="0" smtClean="0">
+            <a:pPr>
+              <a:spcBef>
+                <a:spcPts val="300"/>
+              </a:spcBef>
+              <a:spcAft>
+                <a:spcPts val="300"/>
+              </a:spcAft>
+            </a:pPr>
+            <a:r>
+              <a:rPr lang="en-US" sz="2000" dirty="0">
                 <a:latin typeface="Times New Roman" charset="0"/>
                 <a:ea typeface="Times New Roman" charset="0"/>
                 <a:cs typeface="Times New Roman" charset="0"/>
@@ -11182,8 +11189,16 @@
             </a:r>
           </a:p>
           <a:p>
-            <a:r>
-              <a:rPr lang="en-US" sz="2000" dirty="0" smtClean="0">
+            <a:pPr>
+              <a:spcBef>
+                <a:spcPts val="300"/>
+              </a:spcBef>
+              <a:spcAft>
+                <a:spcPts val="300"/>
+              </a:spcAft>
+            </a:pPr>
+            <a:r>
+              <a:rPr lang="en-US" sz="2000" dirty="0">
                 <a:latin typeface="Times New Roman" charset="0"/>
                 <a:ea typeface="Times New Roman" charset="0"/>
                 <a:cs typeface="Times New Roman" charset="0"/>
@@ -11192,8 +11207,16 @@
             </a:r>
           </a:p>
           <a:p>
-            <a:r>
-              <a:rPr lang="en-US" sz="2000" dirty="0" smtClean="0">
+            <a:pPr>
+              <a:spcBef>
+                <a:spcPts val="300"/>
+              </a:spcBef>
+              <a:spcAft>
+                <a:spcPts val="300"/>
+              </a:spcAft>
+            </a:pPr>
+            <a:r>
+              <a:rPr lang="en-US" sz="2000" dirty="0">
                 <a:latin typeface="Times New Roman" charset="0"/>
                 <a:ea typeface="Times New Roman" charset="0"/>
                 <a:cs typeface="Times New Roman" charset="0"/>
@@ -11202,8 +11225,16 @@
             </a:r>
           </a:p>
           <a:p>
-            <a:r>
-              <a:rPr lang="en-US" sz="2000" dirty="0" smtClean="0">
+            <a:pPr>
+              <a:spcBef>
+                <a:spcPts val="300"/>
+              </a:spcBef>
+              <a:spcAft>
+                <a:spcPts val="300"/>
+              </a:spcAft>
+            </a:pPr>
+            <a:r>
+              <a:rPr lang="en-US" sz="2000" dirty="0">
                 <a:latin typeface="Times New Roman" charset="0"/>
                 <a:ea typeface="Times New Roman" charset="0"/>
                 <a:cs typeface="Times New Roman" charset="0"/>
@@ -11212,13 +11243,39 @@
             </a:r>
           </a:p>
           <a:p>
-            <a:r>
-              <a:rPr lang="en-US" sz="2000" dirty="0" smtClean="0">
+            <a:pPr>
+              <a:spcBef>
+                <a:spcPts val="300"/>
+              </a:spcBef>
+              <a:spcAft>
+                <a:spcPts val="300"/>
+              </a:spcAft>
+            </a:pPr>
+            <a:r>
+              <a:rPr lang="en-US" sz="2000" dirty="0">
                 <a:latin typeface="Times New Roman" charset="0"/>
                 <a:ea typeface="Times New Roman" charset="0"/>
                 <a:cs typeface="Times New Roman" charset="0"/>
               </a:rPr>
-              <a:t>C 4.5</a:t>
+              <a:t>C4.5</a:t>
+            </a:r>
+          </a:p>
+          <a:p>
+            <a:pPr>
+              <a:spcBef>
+                <a:spcPts val="300"/>
+              </a:spcBef>
+              <a:spcAft>
+                <a:spcPts val="300"/>
+              </a:spcAft>
+            </a:pPr>
+            <a:r>
+              <a:rPr lang="en-US" sz="2000" dirty="0">
+                <a:latin typeface="Times New Roman" charset="0"/>
+                <a:ea typeface="Times New Roman" charset="0"/>
+                <a:cs typeface="Times New Roman" charset="0"/>
+              </a:rPr>
+              <a:t>C5.0</a:t>
             </a:r>
           </a:p>
         </p:txBody>
@@ -11263,54 +11320,93 @@
             <p:ph type="title"/>
           </p:nvPr>
         </p:nvSpPr>
-        <p:spPr/>
+        <p:spPr>
+          <a:xfrm>
+            <a:off x="1224973" y="822036"/>
+            <a:ext cx="9742053" cy="1463963"/>
+          </a:xfrm>
+        </p:spPr>
         <p:txBody>
           <a:bodyPr>
-            <a:normAutofit/>
+            <a:noAutofit/>
           </a:bodyPr>
           <a:lstStyle/>
           <a:p>
             <a:r>
-              <a:rPr lang="en-US" sz="3200" b="1" dirty="0" smtClean="0">
-                <a:latin typeface="Times New Roman" charset="0"/>
-                <a:ea typeface="Times New Roman" charset="0"/>
-                <a:cs typeface="Times New Roman" charset="0"/>
+              <a:rPr lang="en-US" sz="3600" b="1" dirty="0">
+                <a:latin typeface="Times New Roman" panose="02020603050405020304" pitchFamily="18" charset="0"/>
+                <a:cs typeface="Times New Roman" panose="02020603050405020304" pitchFamily="18" charset="0"/>
               </a:rPr>
-              <a:t>CART</a:t>
-            </a:r>
-            <a:endParaRPr lang="en-US" sz="3200" b="1" dirty="0">
-              <a:latin typeface="Times New Roman" charset="0"/>
+              <a:t>Accuracy with Different Training Split Fractions​</a:t>
+            </a:r>
+            <a:br>
+              <a:rPr lang="en-US" sz="3600" b="1" dirty="0">
+                <a:latin typeface="Times New Roman" panose="02020603050405020304" pitchFamily="18" charset="0"/>
+                <a:cs typeface="Times New Roman" panose="02020603050405020304" pitchFamily="18" charset="0"/>
+              </a:rPr>
+            </a:br>
+            <a:r>
+              <a:rPr lang="en-US" sz="3600" b="1" dirty="0">
+                <a:latin typeface="Times New Roman" panose="02020603050405020304" pitchFamily="18" charset="0"/>
+                <a:cs typeface="Times New Roman" panose="02020603050405020304" pitchFamily="18" charset="0"/>
+              </a:rPr>
+              <a:t>(CART / C4.5 / C5.0)​</a:t>
+            </a:r>
+            <a:endParaRPr lang="en-US" sz="3600" b="1" dirty="0">
+              <a:latin typeface="Times New Roman" panose="02020603050405020304" pitchFamily="18" charset="0"/>
               <a:ea typeface="Times New Roman" charset="0"/>
-              <a:cs typeface="Times New Roman" charset="0"/>
+              <a:cs typeface="Times New Roman" panose="02020603050405020304" pitchFamily="18" charset="0"/>
             </a:endParaRPr>
           </a:p>
         </p:txBody>
       </p:sp>
-      <p:sp>
-        <p:nvSpPr>
-          <p:cNvPr id="3" name="Content Placeholder 2"/>
-          <p:cNvSpPr>
-            <a:spLocks noGrp="1"/>
-          </p:cNvSpPr>
-          <p:nvPr>
-            <p:ph idx="1"/>
-          </p:nvPr>
-        </p:nvSpPr>
-        <p:spPr/>
-        <p:txBody>
-          <a:bodyPr>
-            <a:normAutofit/>
-          </a:bodyPr>
-          <a:lstStyle/>
-          <a:p>
-            <a:endParaRPr lang="en-US" sz="2000" dirty="0">
-              <a:latin typeface="Times New Roman" charset="0"/>
-              <a:ea typeface="Times New Roman" charset="0"/>
-              <a:cs typeface="Times New Roman" charset="0"/>
-            </a:endParaRPr>
-          </a:p>
-        </p:txBody>
-      </p:sp>
+      <p:pic>
+        <p:nvPicPr>
+          <p:cNvPr id="1026" name="Picture 2" descr="https://lh4.googleusercontent.com/EDf8Tk7SL-hfCDVw9bkoUe44sY8MxpKMjX3Pt9WCE3iWTakJdRe8TpnBHmIgWHo26QnFGw2T97_tnQKokWgB6ETfTsUE83gcfaBUhHZYVwopQtJ9LG0DaFRiZ4_6BY5v8GSpNEPchWo">
+            <a:extLst>
+              <a:ext uri="{FF2B5EF4-FFF2-40B4-BE49-F238E27FC236}">
+                <a16:creationId xmlns:a16="http://schemas.microsoft.com/office/drawing/2014/main" id="{18BBBDBE-3BE9-4EF0-A66E-02E85258AB6B}"/>
+              </a:ext>
+            </a:extLst>
+          </p:cNvPr>
+          <p:cNvPicPr>
+            <a:picLocks noChangeAspect="1" noChangeArrowheads="1"/>
+          </p:cNvPicPr>
+          <p:nvPr/>
+        </p:nvPicPr>
+        <p:blipFill>
+          <a:blip r:embed="rId2">
+            <a:extLst>
+              <a:ext uri="{28A0092B-C50C-407E-A947-70E740481C1C}">
+                <a14:useLocalDpi xmlns:a14="http://schemas.microsoft.com/office/drawing/2010/main" val="0"/>
+              </a:ext>
+            </a:extLst>
+          </a:blip>
+          <a:srcRect/>
+          <a:stretch>
+            <a:fillRect/>
+          </a:stretch>
+        </p:blipFill>
+        <p:spPr bwMode="auto">
+          <a:xfrm>
+            <a:off x="2623381" y="2511260"/>
+            <a:ext cx="6945238" cy="3677103"/>
+          </a:xfrm>
+          <a:prstGeom prst="rect">
+            <a:avLst/>
+          </a:prstGeom>
+          <a:noFill/>
+          <a:extLst>
+            <a:ext uri="{909E8E84-426E-40DD-AFC4-6F175D3DCCD1}">
+              <a14:hiddenFill xmlns:a14="http://schemas.microsoft.com/office/drawing/2010/main">
+                <a:solidFill>
+                  <a:srgbClr val="FFFFFF"/>
+                </a:solidFill>
+              </a14:hiddenFill>
+            </a:ext>
+          </a:extLst>
+        </p:spPr>
+      </p:pic>
     </p:spTree>
     <p:extLst>
       <p:ext uri="{BB962C8B-B14F-4D97-AF65-F5344CB8AC3E}">

</xml_diff>